<commit_message>
Working with CSV and EXCEL Data
</commit_message>
<xml_diff>
--- a/Course Material/Presentations/Working with CSV files.pptx
+++ b/Course Material/Presentations/Working with CSV files.pptx
@@ -9,10 +9,19 @@
     <p:sldId id="257" r:id="rId3"/>
     <p:sldId id="258" r:id="rId4"/>
     <p:sldId id="259" r:id="rId5"/>
-    <p:sldId id="260" r:id="rId6"/>
-    <p:sldId id="261" r:id="rId7"/>
-    <p:sldId id="262" r:id="rId8"/>
-    <p:sldId id="263" r:id="rId9"/>
+    <p:sldId id="267" r:id="rId6"/>
+    <p:sldId id="260" r:id="rId7"/>
+    <p:sldId id="261" r:id="rId8"/>
+    <p:sldId id="262" r:id="rId9"/>
+    <p:sldId id="263" r:id="rId10"/>
+    <p:sldId id="264" r:id="rId11"/>
+    <p:sldId id="266" r:id="rId12"/>
+    <p:sldId id="265" r:id="rId13"/>
+    <p:sldId id="268" r:id="rId14"/>
+    <p:sldId id="269" r:id="rId15"/>
+    <p:sldId id="270" r:id="rId16"/>
+    <p:sldId id="271" r:id="rId17"/>
+    <p:sldId id="272" r:id="rId18"/>
   </p:sldIdLst>
   <p:sldSz cx="12192000" cy="6858000"/>
   <p:notesSz cx="6858000" cy="9144000"/>
@@ -280,7 +289,7 @@
           <a:p>
             <a:fld id="{C477F7B1-4E55-4D1C-B2D3-836A5640D5C6}" type="datetimeFigureOut">
               <a:rPr lang="en-US" smtClean="0"/>
-              <a:t>3/10/2022</a:t>
+              <a:t>3/12/2022</a:t>
             </a:fld>
             <a:endParaRPr lang="en-US"/>
           </a:p>
@@ -441,7 +450,7 @@
           <a:p>
             <a:fld id="{C477F7B1-4E55-4D1C-B2D3-836A5640D5C6}" type="datetimeFigureOut">
               <a:rPr lang="en-US" smtClean="0"/>
-              <a:t>3/10/2022</a:t>
+              <a:t>3/12/2022</a:t>
             </a:fld>
             <a:endParaRPr lang="en-US"/>
           </a:p>
@@ -625,7 +634,7 @@
           <a:p>
             <a:fld id="{C477F7B1-4E55-4D1C-B2D3-836A5640D5C6}" type="datetimeFigureOut">
               <a:rPr lang="en-US" smtClean="0"/>
-              <a:t>3/10/2022</a:t>
+              <a:t>3/12/2022</a:t>
             </a:fld>
             <a:endParaRPr lang="en-US"/>
           </a:p>
@@ -864,7 +873,7 @@
           <a:p>
             <a:fld id="{C477F7B1-4E55-4D1C-B2D3-836A5640D5C6}" type="datetimeFigureOut">
               <a:rPr lang="en-US" smtClean="0"/>
-              <a:t>3/10/2022</a:t>
+              <a:t>3/12/2022</a:t>
             </a:fld>
             <a:endParaRPr lang="en-US"/>
           </a:p>
@@ -1395,10 +1404,10 @@
           <a:lstStyle/>
           <a:p>
             <a:r>
-              <a:rPr lang="en-US"/>
+              <a:rPr lang="en-US" dirty="0"/>
               <a:t>Chandan Sharma</a:t>
             </a:r>
-            <a:endParaRPr lang="en-IN"/>
+            <a:endParaRPr lang="en-IN" dirty="0"/>
           </a:p>
         </p:txBody>
       </p:sp>
@@ -1406,6 +1415,1855 @@
     <p:extLst>
       <p:ext uri="{BB962C8B-B14F-4D97-AF65-F5344CB8AC3E}">
         <p14:creationId xmlns:p14="http://schemas.microsoft.com/office/powerpoint/2010/main" val="2985233526"/>
+      </p:ext>
+    </p:extLst>
+  </p:cSld>
+  <p:clrMapOvr>
+    <a:masterClrMapping/>
+  </p:clrMapOvr>
+</p:sld>
+</file>
+
+<file path=ppt/slides/slide10.xml><?xml version="1.0" encoding="utf-8"?>
+<p:sld xmlns:a="http://schemas.openxmlformats.org/drawingml/2006/main" xmlns:r="http://schemas.openxmlformats.org/officeDocument/2006/relationships" xmlns:p="http://schemas.openxmlformats.org/presentationml/2006/main">
+  <p:cSld>
+    <p:spTree>
+      <p:nvGrpSpPr>
+        <p:cNvPr id="1" name=""/>
+        <p:cNvGrpSpPr/>
+        <p:nvPr/>
+      </p:nvGrpSpPr>
+      <p:grpSpPr>
+        <a:xfrm>
+          <a:off x="0" y="0"/>
+          <a:ext cx="0" cy="0"/>
+          <a:chOff x="0" y="0"/>
+          <a:chExt cx="0" cy="0"/>
+        </a:xfrm>
+      </p:grpSpPr>
+      <p:pic>
+        <p:nvPicPr>
+          <p:cNvPr id="2" name="Picture 1">
+            <a:extLst>
+              <a:ext uri="{FF2B5EF4-FFF2-40B4-BE49-F238E27FC236}">
+                <a16:creationId xmlns:a16="http://schemas.microsoft.com/office/drawing/2014/main" id="{19E0D1FD-A2BA-421B-B1BF-2B14B79A6551}"/>
+              </a:ext>
+            </a:extLst>
+          </p:cNvPr>
+          <p:cNvPicPr>
+            <a:picLocks noChangeAspect="1"/>
+          </p:cNvPicPr>
+          <p:nvPr/>
+        </p:nvPicPr>
+        <p:blipFill>
+          <a:blip r:embed="rId2">
+            <a:extLst>
+              <a:ext uri="{28A0092B-C50C-407E-A947-70E740481C1C}">
+                <a14:useLocalDpi xmlns:a14="http://schemas.microsoft.com/office/drawing/2010/main" val="0"/>
+              </a:ext>
+            </a:extLst>
+          </a:blip>
+          <a:stretch>
+            <a:fillRect/>
+          </a:stretch>
+        </p:blipFill>
+        <p:spPr>
+          <a:xfrm>
+            <a:off x="6729163" y="1855914"/>
+            <a:ext cx="5036820" cy="4335780"/>
+          </a:xfrm>
+          <a:prstGeom prst="rect">
+            <a:avLst/>
+          </a:prstGeom>
+        </p:spPr>
+      </p:pic>
+      <p:sp>
+        <p:nvSpPr>
+          <p:cNvPr id="3" name="Subtitle 2">
+            <a:extLst>
+              <a:ext uri="{FF2B5EF4-FFF2-40B4-BE49-F238E27FC236}">
+                <a16:creationId xmlns:a16="http://schemas.microsoft.com/office/drawing/2014/main" id="{2C23A403-0C5D-4C8E-A893-FD270D2414FB}"/>
+              </a:ext>
+            </a:extLst>
+          </p:cNvPr>
+          <p:cNvSpPr txBox="1">
+            <a:spLocks/>
+          </p:cNvSpPr>
+          <p:nvPr/>
+        </p:nvSpPr>
+        <p:spPr>
+          <a:xfrm>
+            <a:off x="401053" y="595801"/>
+            <a:ext cx="5694947" cy="6026941"/>
+          </a:xfrm>
+          <a:prstGeom prst="rect">
+            <a:avLst/>
+          </a:prstGeom>
+        </p:spPr>
+        <p:txBody>
+          <a:bodyPr/>
+          <a:lstStyle>
+            <a:lvl1pPr marL="228600" indent="-228600" algn="l" defTabSz="914400" rtl="0" eaLnBrk="1" latinLnBrk="0" hangingPunct="1">
+              <a:lnSpc>
+                <a:spcPct val="90000"/>
+              </a:lnSpc>
+              <a:spcBef>
+                <a:spcPts val="1000"/>
+              </a:spcBef>
+              <a:buFont typeface="Arial" panose="020B0604020202020204" pitchFamily="34" charset="0"/>
+              <a:buChar char="•"/>
+              <a:defRPr sz="2800" kern="1200">
+                <a:solidFill>
+                  <a:schemeClr val="tx1"/>
+                </a:solidFill>
+                <a:latin typeface="+mn-lt"/>
+                <a:ea typeface="+mn-ea"/>
+                <a:cs typeface="+mn-cs"/>
+              </a:defRPr>
+            </a:lvl1pPr>
+            <a:lvl2pPr marL="685800" indent="-228600" algn="l" defTabSz="914400" rtl="0" eaLnBrk="1" latinLnBrk="0" hangingPunct="1">
+              <a:lnSpc>
+                <a:spcPct val="90000"/>
+              </a:lnSpc>
+              <a:spcBef>
+                <a:spcPts val="500"/>
+              </a:spcBef>
+              <a:buFont typeface="Arial" panose="020B0604020202020204" pitchFamily="34" charset="0"/>
+              <a:buChar char="•"/>
+              <a:defRPr sz="2400" kern="1200">
+                <a:solidFill>
+                  <a:schemeClr val="tx1"/>
+                </a:solidFill>
+                <a:latin typeface="+mn-lt"/>
+                <a:ea typeface="+mn-ea"/>
+                <a:cs typeface="+mn-cs"/>
+              </a:defRPr>
+            </a:lvl2pPr>
+            <a:lvl3pPr marL="1143000" indent="-228600" algn="l" defTabSz="914400" rtl="0" eaLnBrk="1" latinLnBrk="0" hangingPunct="1">
+              <a:lnSpc>
+                <a:spcPct val="90000"/>
+              </a:lnSpc>
+              <a:spcBef>
+                <a:spcPts val="500"/>
+              </a:spcBef>
+              <a:buFont typeface="Arial" panose="020B0604020202020204" pitchFamily="34" charset="0"/>
+              <a:buChar char="•"/>
+              <a:defRPr sz="2000" kern="1200">
+                <a:solidFill>
+                  <a:schemeClr val="tx1"/>
+                </a:solidFill>
+                <a:latin typeface="+mn-lt"/>
+                <a:ea typeface="+mn-ea"/>
+                <a:cs typeface="+mn-cs"/>
+              </a:defRPr>
+            </a:lvl3pPr>
+            <a:lvl4pPr marL="1600200" indent="-228600" algn="l" defTabSz="914400" rtl="0" eaLnBrk="1" latinLnBrk="0" hangingPunct="1">
+              <a:lnSpc>
+                <a:spcPct val="90000"/>
+              </a:lnSpc>
+              <a:spcBef>
+                <a:spcPts val="500"/>
+              </a:spcBef>
+              <a:buFont typeface="Arial" panose="020B0604020202020204" pitchFamily="34" charset="0"/>
+              <a:buChar char="•"/>
+              <a:defRPr sz="1800" kern="1200">
+                <a:solidFill>
+                  <a:schemeClr val="tx1"/>
+                </a:solidFill>
+                <a:latin typeface="+mn-lt"/>
+                <a:ea typeface="+mn-ea"/>
+                <a:cs typeface="+mn-cs"/>
+              </a:defRPr>
+            </a:lvl4pPr>
+            <a:lvl5pPr marL="2057400" indent="-228600" algn="l" defTabSz="914400" rtl="0" eaLnBrk="1" latinLnBrk="0" hangingPunct="1">
+              <a:lnSpc>
+                <a:spcPct val="90000"/>
+              </a:lnSpc>
+              <a:spcBef>
+                <a:spcPts val="500"/>
+              </a:spcBef>
+              <a:buFont typeface="Arial" panose="020B0604020202020204" pitchFamily="34" charset="0"/>
+              <a:buChar char="•"/>
+              <a:defRPr sz="1800" kern="1200">
+                <a:solidFill>
+                  <a:schemeClr val="tx1"/>
+                </a:solidFill>
+                <a:latin typeface="+mn-lt"/>
+                <a:ea typeface="+mn-ea"/>
+                <a:cs typeface="+mn-cs"/>
+              </a:defRPr>
+            </a:lvl5pPr>
+            <a:lvl6pPr marL="2514600" indent="-228600" algn="l" defTabSz="914400" rtl="0" eaLnBrk="1" latinLnBrk="0" hangingPunct="1">
+              <a:lnSpc>
+                <a:spcPct val="90000"/>
+              </a:lnSpc>
+              <a:spcBef>
+                <a:spcPts val="500"/>
+              </a:spcBef>
+              <a:buFont typeface="Arial" panose="020B0604020202020204" pitchFamily="34" charset="0"/>
+              <a:buChar char="•"/>
+              <a:defRPr sz="1800" kern="1200">
+                <a:solidFill>
+                  <a:schemeClr val="tx1"/>
+                </a:solidFill>
+                <a:latin typeface="+mn-lt"/>
+                <a:ea typeface="+mn-ea"/>
+                <a:cs typeface="+mn-cs"/>
+              </a:defRPr>
+            </a:lvl6pPr>
+            <a:lvl7pPr marL="2971800" indent="-228600" algn="l" defTabSz="914400" rtl="0" eaLnBrk="1" latinLnBrk="0" hangingPunct="1">
+              <a:lnSpc>
+                <a:spcPct val="90000"/>
+              </a:lnSpc>
+              <a:spcBef>
+                <a:spcPts val="500"/>
+              </a:spcBef>
+              <a:buFont typeface="Arial" panose="020B0604020202020204" pitchFamily="34" charset="0"/>
+              <a:buChar char="•"/>
+              <a:defRPr sz="1800" kern="1200">
+                <a:solidFill>
+                  <a:schemeClr val="tx1"/>
+                </a:solidFill>
+                <a:latin typeface="+mn-lt"/>
+                <a:ea typeface="+mn-ea"/>
+                <a:cs typeface="+mn-cs"/>
+              </a:defRPr>
+            </a:lvl7pPr>
+            <a:lvl8pPr marL="3429000" indent="-228600" algn="l" defTabSz="914400" rtl="0" eaLnBrk="1" latinLnBrk="0" hangingPunct="1">
+              <a:lnSpc>
+                <a:spcPct val="90000"/>
+              </a:lnSpc>
+              <a:spcBef>
+                <a:spcPts val="500"/>
+              </a:spcBef>
+              <a:buFont typeface="Arial" panose="020B0604020202020204" pitchFamily="34" charset="0"/>
+              <a:buChar char="•"/>
+              <a:defRPr sz="1800" kern="1200">
+                <a:solidFill>
+                  <a:schemeClr val="tx1"/>
+                </a:solidFill>
+                <a:latin typeface="+mn-lt"/>
+                <a:ea typeface="+mn-ea"/>
+                <a:cs typeface="+mn-cs"/>
+              </a:defRPr>
+            </a:lvl8pPr>
+            <a:lvl9pPr marL="3886200" indent="-228600" algn="l" defTabSz="914400" rtl="0" eaLnBrk="1" latinLnBrk="0" hangingPunct="1">
+              <a:lnSpc>
+                <a:spcPct val="90000"/>
+              </a:lnSpc>
+              <a:spcBef>
+                <a:spcPts val="500"/>
+              </a:spcBef>
+              <a:buFont typeface="Arial" panose="020B0604020202020204" pitchFamily="34" charset="0"/>
+              <a:buChar char="•"/>
+              <a:defRPr sz="1800" kern="1200">
+                <a:solidFill>
+                  <a:schemeClr val="tx1"/>
+                </a:solidFill>
+                <a:latin typeface="+mn-lt"/>
+                <a:ea typeface="+mn-ea"/>
+                <a:cs typeface="+mn-cs"/>
+              </a:defRPr>
+            </a:lvl9pPr>
+          </a:lstStyle>
+          <a:p>
+            <a:pPr marL="0" indent="0">
+              <a:buNone/>
+            </a:pPr>
+            <a:r>
+              <a:rPr lang="en-US" dirty="0"/>
+              <a:t>Working with EXCEL files:</a:t>
+            </a:r>
+          </a:p>
+          <a:p>
+            <a:r>
+              <a:rPr lang="en-US" dirty="0"/>
+              <a:t>We can use the import </a:t>
+            </a:r>
+            <a:r>
+              <a:rPr lang="en-US" dirty="0" err="1"/>
+              <a:t>xlrd</a:t>
+            </a:r>
+            <a:r>
+              <a:rPr lang="en-US" dirty="0"/>
+              <a:t> package to work with excel files.</a:t>
+            </a:r>
+          </a:p>
+          <a:p>
+            <a:r>
+              <a:rPr lang="en-US" dirty="0"/>
+              <a:t>We start reading content of an excel file by first opening it.</a:t>
+            </a:r>
+          </a:p>
+          <a:p>
+            <a:r>
+              <a:rPr lang="en-US" dirty="0"/>
+              <a:t>The method is </a:t>
+            </a:r>
+            <a:r>
+              <a:rPr lang="en-US" dirty="0" err="1"/>
+              <a:t>open_workbook</a:t>
+            </a:r>
+            <a:r>
+              <a:rPr lang="en-US" dirty="0"/>
+              <a:t>()</a:t>
+            </a:r>
+          </a:p>
+          <a:p>
+            <a:r>
+              <a:rPr lang="en-US" dirty="0"/>
+              <a:t>An excel file can have multiple sheets </a:t>
+            </a:r>
+          </a:p>
+          <a:p>
+            <a:pPr lvl="1"/>
+            <a:r>
+              <a:rPr lang="en-US" dirty="0"/>
+              <a:t>We can use the </a:t>
+            </a:r>
+            <a:r>
+              <a:rPr lang="en-US" dirty="0" err="1"/>
+              <a:t>sheet_by_index</a:t>
+            </a:r>
+            <a:r>
+              <a:rPr lang="en-US" dirty="0"/>
+              <a:t>() method to read the first sheet.</a:t>
+            </a:r>
+          </a:p>
+          <a:p>
+            <a:pPr lvl="1"/>
+            <a:r>
+              <a:rPr lang="en-US" dirty="0"/>
+              <a:t>The </a:t>
+            </a:r>
+            <a:r>
+              <a:rPr lang="en-US" dirty="0" err="1"/>
+              <a:t>nrows</a:t>
+            </a:r>
+            <a:r>
+              <a:rPr lang="en-US" dirty="0"/>
+              <a:t> and </a:t>
+            </a:r>
+            <a:r>
+              <a:rPr lang="en-US" dirty="0" err="1"/>
+              <a:t>ncols</a:t>
+            </a:r>
+            <a:r>
+              <a:rPr lang="en-US" dirty="0"/>
+              <a:t> can be used to fetch total number of rows and columns in an excel sheet.</a:t>
+            </a:r>
+          </a:p>
+          <a:p>
+            <a:endParaRPr lang="en-US" dirty="0"/>
+          </a:p>
+        </p:txBody>
+      </p:sp>
+    </p:spTree>
+    <p:extLst>
+      <p:ext uri="{BB962C8B-B14F-4D97-AF65-F5344CB8AC3E}">
+        <p14:creationId xmlns:p14="http://schemas.microsoft.com/office/powerpoint/2010/main" val="662925782"/>
+      </p:ext>
+    </p:extLst>
+  </p:cSld>
+  <p:clrMapOvr>
+    <a:masterClrMapping/>
+  </p:clrMapOvr>
+</p:sld>
+</file>
+
+<file path=ppt/slides/slide11.xml><?xml version="1.0" encoding="utf-8"?>
+<p:sld xmlns:a="http://schemas.openxmlformats.org/drawingml/2006/main" xmlns:r="http://schemas.openxmlformats.org/officeDocument/2006/relationships" xmlns:p="http://schemas.openxmlformats.org/presentationml/2006/main">
+  <p:cSld>
+    <p:spTree>
+      <p:nvGrpSpPr>
+        <p:cNvPr id="1" name=""/>
+        <p:cNvGrpSpPr/>
+        <p:nvPr/>
+      </p:nvGrpSpPr>
+      <p:grpSpPr>
+        <a:xfrm>
+          <a:off x="0" y="0"/>
+          <a:ext cx="0" cy="0"/>
+          <a:chOff x="0" y="0"/>
+          <a:chExt cx="0" cy="0"/>
+        </a:xfrm>
+      </p:grpSpPr>
+      <p:pic>
+        <p:nvPicPr>
+          <p:cNvPr id="2" name="Picture Placeholder 5" descr="Read_XLS.py - PythonSkillDev - Visual Studio Code">
+            <a:extLst>
+              <a:ext uri="{FF2B5EF4-FFF2-40B4-BE49-F238E27FC236}">
+                <a16:creationId xmlns:a16="http://schemas.microsoft.com/office/drawing/2014/main" id="{92EC5ED2-DA2A-4B39-BF4B-9A385EB4D3D7}"/>
+              </a:ext>
+            </a:extLst>
+          </p:cNvPr>
+          <p:cNvPicPr>
+            <a:picLocks noChangeAspect="1"/>
+          </p:cNvPicPr>
+          <p:nvPr/>
+        </p:nvPicPr>
+        <p:blipFill>
+          <a:blip r:embed="rId2">
+            <a:extLst>
+              <a:ext uri="{28A0092B-C50C-407E-A947-70E740481C1C}">
+                <a14:useLocalDpi xmlns:a14="http://schemas.microsoft.com/office/drawing/2010/main" val="0"/>
+              </a:ext>
+            </a:extLst>
+          </a:blip>
+          <a:srcRect/>
+          <a:stretch>
+            <a:fillRect/>
+          </a:stretch>
+        </p:blipFill>
+        <p:spPr>
+          <a:xfrm>
+            <a:off x="4550257" y="1740023"/>
+            <a:ext cx="7293402" cy="2900593"/>
+          </a:xfrm>
+          <a:prstGeom prst="rect">
+            <a:avLst/>
+          </a:prstGeom>
+        </p:spPr>
+      </p:pic>
+      <p:sp>
+        <p:nvSpPr>
+          <p:cNvPr id="3" name="Subtitle 2">
+            <a:extLst>
+              <a:ext uri="{FF2B5EF4-FFF2-40B4-BE49-F238E27FC236}">
+                <a16:creationId xmlns:a16="http://schemas.microsoft.com/office/drawing/2014/main" id="{746D8A90-5346-4947-B897-862F940E5409}"/>
+              </a:ext>
+            </a:extLst>
+          </p:cNvPr>
+          <p:cNvSpPr txBox="1">
+            <a:spLocks/>
+          </p:cNvSpPr>
+          <p:nvPr/>
+        </p:nvSpPr>
+        <p:spPr>
+          <a:xfrm>
+            <a:off x="401053" y="595802"/>
+            <a:ext cx="4011149" cy="4650902"/>
+          </a:xfrm>
+          <a:prstGeom prst="rect">
+            <a:avLst/>
+          </a:prstGeom>
+        </p:spPr>
+        <p:txBody>
+          <a:bodyPr/>
+          <a:lstStyle>
+            <a:lvl1pPr marL="228600" indent="-228600" algn="l" defTabSz="914400" rtl="0" eaLnBrk="1" latinLnBrk="0" hangingPunct="1">
+              <a:lnSpc>
+                <a:spcPct val="90000"/>
+              </a:lnSpc>
+              <a:spcBef>
+                <a:spcPts val="1000"/>
+              </a:spcBef>
+              <a:buFont typeface="Arial" panose="020B0604020202020204" pitchFamily="34" charset="0"/>
+              <a:buChar char="•"/>
+              <a:defRPr sz="2800" kern="1200">
+                <a:solidFill>
+                  <a:schemeClr val="tx1"/>
+                </a:solidFill>
+                <a:latin typeface="+mn-lt"/>
+                <a:ea typeface="+mn-ea"/>
+                <a:cs typeface="+mn-cs"/>
+              </a:defRPr>
+            </a:lvl1pPr>
+            <a:lvl2pPr marL="685800" indent="-228600" algn="l" defTabSz="914400" rtl="0" eaLnBrk="1" latinLnBrk="0" hangingPunct="1">
+              <a:lnSpc>
+                <a:spcPct val="90000"/>
+              </a:lnSpc>
+              <a:spcBef>
+                <a:spcPts val="500"/>
+              </a:spcBef>
+              <a:buFont typeface="Arial" panose="020B0604020202020204" pitchFamily="34" charset="0"/>
+              <a:buChar char="•"/>
+              <a:defRPr sz="2400" kern="1200">
+                <a:solidFill>
+                  <a:schemeClr val="tx1"/>
+                </a:solidFill>
+                <a:latin typeface="+mn-lt"/>
+                <a:ea typeface="+mn-ea"/>
+                <a:cs typeface="+mn-cs"/>
+              </a:defRPr>
+            </a:lvl2pPr>
+            <a:lvl3pPr marL="1143000" indent="-228600" algn="l" defTabSz="914400" rtl="0" eaLnBrk="1" latinLnBrk="0" hangingPunct="1">
+              <a:lnSpc>
+                <a:spcPct val="90000"/>
+              </a:lnSpc>
+              <a:spcBef>
+                <a:spcPts val="500"/>
+              </a:spcBef>
+              <a:buFont typeface="Arial" panose="020B0604020202020204" pitchFamily="34" charset="0"/>
+              <a:buChar char="•"/>
+              <a:defRPr sz="2000" kern="1200">
+                <a:solidFill>
+                  <a:schemeClr val="tx1"/>
+                </a:solidFill>
+                <a:latin typeface="+mn-lt"/>
+                <a:ea typeface="+mn-ea"/>
+                <a:cs typeface="+mn-cs"/>
+              </a:defRPr>
+            </a:lvl3pPr>
+            <a:lvl4pPr marL="1600200" indent="-228600" algn="l" defTabSz="914400" rtl="0" eaLnBrk="1" latinLnBrk="0" hangingPunct="1">
+              <a:lnSpc>
+                <a:spcPct val="90000"/>
+              </a:lnSpc>
+              <a:spcBef>
+                <a:spcPts val="500"/>
+              </a:spcBef>
+              <a:buFont typeface="Arial" panose="020B0604020202020204" pitchFamily="34" charset="0"/>
+              <a:buChar char="•"/>
+              <a:defRPr sz="1800" kern="1200">
+                <a:solidFill>
+                  <a:schemeClr val="tx1"/>
+                </a:solidFill>
+                <a:latin typeface="+mn-lt"/>
+                <a:ea typeface="+mn-ea"/>
+                <a:cs typeface="+mn-cs"/>
+              </a:defRPr>
+            </a:lvl4pPr>
+            <a:lvl5pPr marL="2057400" indent="-228600" algn="l" defTabSz="914400" rtl="0" eaLnBrk="1" latinLnBrk="0" hangingPunct="1">
+              <a:lnSpc>
+                <a:spcPct val="90000"/>
+              </a:lnSpc>
+              <a:spcBef>
+                <a:spcPts val="500"/>
+              </a:spcBef>
+              <a:buFont typeface="Arial" panose="020B0604020202020204" pitchFamily="34" charset="0"/>
+              <a:buChar char="•"/>
+              <a:defRPr sz="1800" kern="1200">
+                <a:solidFill>
+                  <a:schemeClr val="tx1"/>
+                </a:solidFill>
+                <a:latin typeface="+mn-lt"/>
+                <a:ea typeface="+mn-ea"/>
+                <a:cs typeface="+mn-cs"/>
+              </a:defRPr>
+            </a:lvl5pPr>
+            <a:lvl6pPr marL="2514600" indent="-228600" algn="l" defTabSz="914400" rtl="0" eaLnBrk="1" latinLnBrk="0" hangingPunct="1">
+              <a:lnSpc>
+                <a:spcPct val="90000"/>
+              </a:lnSpc>
+              <a:spcBef>
+                <a:spcPts val="500"/>
+              </a:spcBef>
+              <a:buFont typeface="Arial" panose="020B0604020202020204" pitchFamily="34" charset="0"/>
+              <a:buChar char="•"/>
+              <a:defRPr sz="1800" kern="1200">
+                <a:solidFill>
+                  <a:schemeClr val="tx1"/>
+                </a:solidFill>
+                <a:latin typeface="+mn-lt"/>
+                <a:ea typeface="+mn-ea"/>
+                <a:cs typeface="+mn-cs"/>
+              </a:defRPr>
+            </a:lvl6pPr>
+            <a:lvl7pPr marL="2971800" indent="-228600" algn="l" defTabSz="914400" rtl="0" eaLnBrk="1" latinLnBrk="0" hangingPunct="1">
+              <a:lnSpc>
+                <a:spcPct val="90000"/>
+              </a:lnSpc>
+              <a:spcBef>
+                <a:spcPts val="500"/>
+              </a:spcBef>
+              <a:buFont typeface="Arial" panose="020B0604020202020204" pitchFamily="34" charset="0"/>
+              <a:buChar char="•"/>
+              <a:defRPr sz="1800" kern="1200">
+                <a:solidFill>
+                  <a:schemeClr val="tx1"/>
+                </a:solidFill>
+                <a:latin typeface="+mn-lt"/>
+                <a:ea typeface="+mn-ea"/>
+                <a:cs typeface="+mn-cs"/>
+              </a:defRPr>
+            </a:lvl7pPr>
+            <a:lvl8pPr marL="3429000" indent="-228600" algn="l" defTabSz="914400" rtl="0" eaLnBrk="1" latinLnBrk="0" hangingPunct="1">
+              <a:lnSpc>
+                <a:spcPct val="90000"/>
+              </a:lnSpc>
+              <a:spcBef>
+                <a:spcPts val="500"/>
+              </a:spcBef>
+              <a:buFont typeface="Arial" panose="020B0604020202020204" pitchFamily="34" charset="0"/>
+              <a:buChar char="•"/>
+              <a:defRPr sz="1800" kern="1200">
+                <a:solidFill>
+                  <a:schemeClr val="tx1"/>
+                </a:solidFill>
+                <a:latin typeface="+mn-lt"/>
+                <a:ea typeface="+mn-ea"/>
+                <a:cs typeface="+mn-cs"/>
+              </a:defRPr>
+            </a:lvl8pPr>
+            <a:lvl9pPr marL="3886200" indent="-228600" algn="l" defTabSz="914400" rtl="0" eaLnBrk="1" latinLnBrk="0" hangingPunct="1">
+              <a:lnSpc>
+                <a:spcPct val="90000"/>
+              </a:lnSpc>
+              <a:spcBef>
+                <a:spcPts val="500"/>
+              </a:spcBef>
+              <a:buFont typeface="Arial" panose="020B0604020202020204" pitchFamily="34" charset="0"/>
+              <a:buChar char="•"/>
+              <a:defRPr sz="1800" kern="1200">
+                <a:solidFill>
+                  <a:schemeClr val="tx1"/>
+                </a:solidFill>
+                <a:latin typeface="+mn-lt"/>
+                <a:ea typeface="+mn-ea"/>
+                <a:cs typeface="+mn-cs"/>
+              </a:defRPr>
+            </a:lvl9pPr>
+          </a:lstStyle>
+          <a:p>
+            <a:pPr marL="0" indent="0">
+              <a:buNone/>
+            </a:pPr>
+            <a:r>
+              <a:rPr lang="en-US" dirty="0"/>
+              <a:t>Working with EXCEL files:</a:t>
+            </a:r>
+          </a:p>
+          <a:p>
+            <a:r>
+              <a:rPr lang="en-US" dirty="0"/>
+              <a:t>The nested for loops are used to read contents of excel sheet.</a:t>
+            </a:r>
+          </a:p>
+          <a:p>
+            <a:r>
+              <a:rPr lang="en-US" dirty="0"/>
+              <a:t>We can also pass the sheet columns and instantiate an array  as shown in the code.</a:t>
+            </a:r>
+          </a:p>
+        </p:txBody>
+      </p:sp>
+    </p:spTree>
+    <p:extLst>
+      <p:ext uri="{BB962C8B-B14F-4D97-AF65-F5344CB8AC3E}">
+        <p14:creationId xmlns:p14="http://schemas.microsoft.com/office/powerpoint/2010/main" val="161385902"/>
+      </p:ext>
+    </p:extLst>
+  </p:cSld>
+  <p:clrMapOvr>
+    <a:masterClrMapping/>
+  </p:clrMapOvr>
+</p:sld>
+</file>
+
+<file path=ppt/slides/slide12.xml><?xml version="1.0" encoding="utf-8"?>
+<p:sld xmlns:a="http://schemas.openxmlformats.org/drawingml/2006/main" xmlns:r="http://schemas.openxmlformats.org/officeDocument/2006/relationships" xmlns:p="http://schemas.openxmlformats.org/presentationml/2006/main">
+  <p:cSld>
+    <p:spTree>
+      <p:nvGrpSpPr>
+        <p:cNvPr id="1" name=""/>
+        <p:cNvGrpSpPr/>
+        <p:nvPr/>
+      </p:nvGrpSpPr>
+      <p:grpSpPr>
+        <a:xfrm>
+          <a:off x="0" y="0"/>
+          <a:ext cx="0" cy="0"/>
+          <a:chOff x="0" y="0"/>
+          <a:chExt cx="0" cy="0"/>
+        </a:xfrm>
+      </p:grpSpPr>
+      <p:pic>
+        <p:nvPicPr>
+          <p:cNvPr id="3" name="Picture Placeholder 5" descr="ExcelSheet.py - PythonSkillDev - Visual Studio Code">
+            <a:extLst>
+              <a:ext uri="{FF2B5EF4-FFF2-40B4-BE49-F238E27FC236}">
+                <a16:creationId xmlns:a16="http://schemas.microsoft.com/office/drawing/2014/main" id="{431B6CD8-E630-409E-88B5-6D4126E5441B}"/>
+              </a:ext>
+            </a:extLst>
+          </p:cNvPr>
+          <p:cNvPicPr>
+            <a:picLocks noChangeAspect="1"/>
+          </p:cNvPicPr>
+          <p:nvPr/>
+        </p:nvPicPr>
+        <p:blipFill>
+          <a:blip r:embed="rId2">
+            <a:extLst>
+              <a:ext uri="{28A0092B-C50C-407E-A947-70E740481C1C}">
+                <a14:useLocalDpi xmlns:a14="http://schemas.microsoft.com/office/drawing/2010/main" val="0"/>
+              </a:ext>
+            </a:extLst>
+          </a:blip>
+          <a:srcRect/>
+          <a:stretch>
+            <a:fillRect/>
+          </a:stretch>
+        </p:blipFill>
+        <p:spPr>
+          <a:xfrm>
+            <a:off x="4517258" y="1236787"/>
+            <a:ext cx="7501627" cy="3500261"/>
+          </a:xfrm>
+          <a:prstGeom prst="rect">
+            <a:avLst/>
+          </a:prstGeom>
+        </p:spPr>
+      </p:pic>
+      <p:sp>
+        <p:nvSpPr>
+          <p:cNvPr id="4" name="Subtitle 2">
+            <a:extLst>
+              <a:ext uri="{FF2B5EF4-FFF2-40B4-BE49-F238E27FC236}">
+                <a16:creationId xmlns:a16="http://schemas.microsoft.com/office/drawing/2014/main" id="{9BE550A5-34C0-4AA2-8713-4608D1E8911C}"/>
+              </a:ext>
+            </a:extLst>
+          </p:cNvPr>
+          <p:cNvSpPr txBox="1">
+            <a:spLocks/>
+          </p:cNvSpPr>
+          <p:nvPr/>
+        </p:nvSpPr>
+        <p:spPr>
+          <a:xfrm>
+            <a:off x="392175" y="1306016"/>
+            <a:ext cx="3522877" cy="4650902"/>
+          </a:xfrm>
+          <a:prstGeom prst="rect">
+            <a:avLst/>
+          </a:prstGeom>
+        </p:spPr>
+        <p:txBody>
+          <a:bodyPr/>
+          <a:lstStyle>
+            <a:lvl1pPr marL="228600" indent="-228600" algn="l" defTabSz="914400" rtl="0" eaLnBrk="1" latinLnBrk="0" hangingPunct="1">
+              <a:lnSpc>
+                <a:spcPct val="90000"/>
+              </a:lnSpc>
+              <a:spcBef>
+                <a:spcPts val="1000"/>
+              </a:spcBef>
+              <a:buFont typeface="Arial" panose="020B0604020202020204" pitchFamily="34" charset="0"/>
+              <a:buChar char="•"/>
+              <a:defRPr sz="2800" kern="1200">
+                <a:solidFill>
+                  <a:schemeClr val="tx1"/>
+                </a:solidFill>
+                <a:latin typeface="+mn-lt"/>
+                <a:ea typeface="+mn-ea"/>
+                <a:cs typeface="+mn-cs"/>
+              </a:defRPr>
+            </a:lvl1pPr>
+            <a:lvl2pPr marL="685800" indent="-228600" algn="l" defTabSz="914400" rtl="0" eaLnBrk="1" latinLnBrk="0" hangingPunct="1">
+              <a:lnSpc>
+                <a:spcPct val="90000"/>
+              </a:lnSpc>
+              <a:spcBef>
+                <a:spcPts val="500"/>
+              </a:spcBef>
+              <a:buFont typeface="Arial" panose="020B0604020202020204" pitchFamily="34" charset="0"/>
+              <a:buChar char="•"/>
+              <a:defRPr sz="2400" kern="1200">
+                <a:solidFill>
+                  <a:schemeClr val="tx1"/>
+                </a:solidFill>
+                <a:latin typeface="+mn-lt"/>
+                <a:ea typeface="+mn-ea"/>
+                <a:cs typeface="+mn-cs"/>
+              </a:defRPr>
+            </a:lvl2pPr>
+            <a:lvl3pPr marL="1143000" indent="-228600" algn="l" defTabSz="914400" rtl="0" eaLnBrk="1" latinLnBrk="0" hangingPunct="1">
+              <a:lnSpc>
+                <a:spcPct val="90000"/>
+              </a:lnSpc>
+              <a:spcBef>
+                <a:spcPts val="500"/>
+              </a:spcBef>
+              <a:buFont typeface="Arial" panose="020B0604020202020204" pitchFamily="34" charset="0"/>
+              <a:buChar char="•"/>
+              <a:defRPr sz="2000" kern="1200">
+                <a:solidFill>
+                  <a:schemeClr val="tx1"/>
+                </a:solidFill>
+                <a:latin typeface="+mn-lt"/>
+                <a:ea typeface="+mn-ea"/>
+                <a:cs typeface="+mn-cs"/>
+              </a:defRPr>
+            </a:lvl3pPr>
+            <a:lvl4pPr marL="1600200" indent="-228600" algn="l" defTabSz="914400" rtl="0" eaLnBrk="1" latinLnBrk="0" hangingPunct="1">
+              <a:lnSpc>
+                <a:spcPct val="90000"/>
+              </a:lnSpc>
+              <a:spcBef>
+                <a:spcPts val="500"/>
+              </a:spcBef>
+              <a:buFont typeface="Arial" panose="020B0604020202020204" pitchFamily="34" charset="0"/>
+              <a:buChar char="•"/>
+              <a:defRPr sz="1800" kern="1200">
+                <a:solidFill>
+                  <a:schemeClr val="tx1"/>
+                </a:solidFill>
+                <a:latin typeface="+mn-lt"/>
+                <a:ea typeface="+mn-ea"/>
+                <a:cs typeface="+mn-cs"/>
+              </a:defRPr>
+            </a:lvl4pPr>
+            <a:lvl5pPr marL="2057400" indent="-228600" algn="l" defTabSz="914400" rtl="0" eaLnBrk="1" latinLnBrk="0" hangingPunct="1">
+              <a:lnSpc>
+                <a:spcPct val="90000"/>
+              </a:lnSpc>
+              <a:spcBef>
+                <a:spcPts val="500"/>
+              </a:spcBef>
+              <a:buFont typeface="Arial" panose="020B0604020202020204" pitchFamily="34" charset="0"/>
+              <a:buChar char="•"/>
+              <a:defRPr sz="1800" kern="1200">
+                <a:solidFill>
+                  <a:schemeClr val="tx1"/>
+                </a:solidFill>
+                <a:latin typeface="+mn-lt"/>
+                <a:ea typeface="+mn-ea"/>
+                <a:cs typeface="+mn-cs"/>
+              </a:defRPr>
+            </a:lvl5pPr>
+            <a:lvl6pPr marL="2514600" indent="-228600" algn="l" defTabSz="914400" rtl="0" eaLnBrk="1" latinLnBrk="0" hangingPunct="1">
+              <a:lnSpc>
+                <a:spcPct val="90000"/>
+              </a:lnSpc>
+              <a:spcBef>
+                <a:spcPts val="500"/>
+              </a:spcBef>
+              <a:buFont typeface="Arial" panose="020B0604020202020204" pitchFamily="34" charset="0"/>
+              <a:buChar char="•"/>
+              <a:defRPr sz="1800" kern="1200">
+                <a:solidFill>
+                  <a:schemeClr val="tx1"/>
+                </a:solidFill>
+                <a:latin typeface="+mn-lt"/>
+                <a:ea typeface="+mn-ea"/>
+                <a:cs typeface="+mn-cs"/>
+              </a:defRPr>
+            </a:lvl6pPr>
+            <a:lvl7pPr marL="2971800" indent="-228600" algn="l" defTabSz="914400" rtl="0" eaLnBrk="1" latinLnBrk="0" hangingPunct="1">
+              <a:lnSpc>
+                <a:spcPct val="90000"/>
+              </a:lnSpc>
+              <a:spcBef>
+                <a:spcPts val="500"/>
+              </a:spcBef>
+              <a:buFont typeface="Arial" panose="020B0604020202020204" pitchFamily="34" charset="0"/>
+              <a:buChar char="•"/>
+              <a:defRPr sz="1800" kern="1200">
+                <a:solidFill>
+                  <a:schemeClr val="tx1"/>
+                </a:solidFill>
+                <a:latin typeface="+mn-lt"/>
+                <a:ea typeface="+mn-ea"/>
+                <a:cs typeface="+mn-cs"/>
+              </a:defRPr>
+            </a:lvl7pPr>
+            <a:lvl8pPr marL="3429000" indent="-228600" algn="l" defTabSz="914400" rtl="0" eaLnBrk="1" latinLnBrk="0" hangingPunct="1">
+              <a:lnSpc>
+                <a:spcPct val="90000"/>
+              </a:lnSpc>
+              <a:spcBef>
+                <a:spcPts val="500"/>
+              </a:spcBef>
+              <a:buFont typeface="Arial" panose="020B0604020202020204" pitchFamily="34" charset="0"/>
+              <a:buChar char="•"/>
+              <a:defRPr sz="1800" kern="1200">
+                <a:solidFill>
+                  <a:schemeClr val="tx1"/>
+                </a:solidFill>
+                <a:latin typeface="+mn-lt"/>
+                <a:ea typeface="+mn-ea"/>
+                <a:cs typeface="+mn-cs"/>
+              </a:defRPr>
+            </a:lvl8pPr>
+            <a:lvl9pPr marL="3886200" indent="-228600" algn="l" defTabSz="914400" rtl="0" eaLnBrk="1" latinLnBrk="0" hangingPunct="1">
+              <a:lnSpc>
+                <a:spcPct val="90000"/>
+              </a:lnSpc>
+              <a:spcBef>
+                <a:spcPts val="500"/>
+              </a:spcBef>
+              <a:buFont typeface="Arial" panose="020B0604020202020204" pitchFamily="34" charset="0"/>
+              <a:buChar char="•"/>
+              <a:defRPr sz="1800" kern="1200">
+                <a:solidFill>
+                  <a:schemeClr val="tx1"/>
+                </a:solidFill>
+                <a:latin typeface="+mn-lt"/>
+                <a:ea typeface="+mn-ea"/>
+                <a:cs typeface="+mn-cs"/>
+              </a:defRPr>
+            </a:lvl9pPr>
+          </a:lstStyle>
+          <a:p>
+            <a:pPr marL="0" indent="0">
+              <a:buNone/>
+            </a:pPr>
+            <a:r>
+              <a:rPr lang="en-US" dirty="0"/>
+              <a:t>Working with EXCEL files:</a:t>
+            </a:r>
+          </a:p>
+          <a:p>
+            <a:r>
+              <a:rPr lang="en-US" dirty="0"/>
+              <a:t>Python also provides another powerful package </a:t>
+            </a:r>
+            <a:r>
+              <a:rPr lang="en-US" dirty="0" err="1"/>
+              <a:t>openpyxl</a:t>
+            </a:r>
+            <a:r>
+              <a:rPr lang="en-US" dirty="0"/>
+              <a:t> for working with excel data.</a:t>
+            </a:r>
+          </a:p>
+          <a:p>
+            <a:r>
+              <a:rPr lang="en-US" dirty="0"/>
+              <a:t>As shown in the code. </a:t>
+            </a:r>
+          </a:p>
+        </p:txBody>
+      </p:sp>
+    </p:spTree>
+    <p:extLst>
+      <p:ext uri="{BB962C8B-B14F-4D97-AF65-F5344CB8AC3E}">
+        <p14:creationId xmlns:p14="http://schemas.microsoft.com/office/powerpoint/2010/main" val="4029670973"/>
+      </p:ext>
+    </p:extLst>
+  </p:cSld>
+  <p:clrMapOvr>
+    <a:masterClrMapping/>
+  </p:clrMapOvr>
+</p:sld>
+</file>
+
+<file path=ppt/slides/slide13.xml><?xml version="1.0" encoding="utf-8"?>
+<p:sld xmlns:a="http://schemas.openxmlformats.org/drawingml/2006/main" xmlns:r="http://schemas.openxmlformats.org/officeDocument/2006/relationships" xmlns:p="http://schemas.openxmlformats.org/presentationml/2006/main">
+  <p:cSld>
+    <p:spTree>
+      <p:nvGrpSpPr>
+        <p:cNvPr id="1" name=""/>
+        <p:cNvGrpSpPr/>
+        <p:nvPr/>
+      </p:nvGrpSpPr>
+      <p:grpSpPr>
+        <a:xfrm>
+          <a:off x="0" y="0"/>
+          <a:ext cx="0" cy="0"/>
+          <a:chOff x="0" y="0"/>
+          <a:chExt cx="0" cy="0"/>
+        </a:xfrm>
+      </p:grpSpPr>
+      <p:sp>
+        <p:nvSpPr>
+          <p:cNvPr id="3" name="Subtitle 2">
+            <a:extLst>
+              <a:ext uri="{FF2B5EF4-FFF2-40B4-BE49-F238E27FC236}">
+                <a16:creationId xmlns:a16="http://schemas.microsoft.com/office/drawing/2014/main" id="{7543E0D8-D7C2-4249-BC02-E864958A4F46}"/>
+              </a:ext>
+            </a:extLst>
+          </p:cNvPr>
+          <p:cNvSpPr txBox="1">
+            <a:spLocks/>
+          </p:cNvSpPr>
+          <p:nvPr/>
+        </p:nvSpPr>
+        <p:spPr>
+          <a:xfrm>
+            <a:off x="489830" y="595803"/>
+            <a:ext cx="3522877" cy="2742201"/>
+          </a:xfrm>
+          <a:prstGeom prst="rect">
+            <a:avLst/>
+          </a:prstGeom>
+        </p:spPr>
+        <p:txBody>
+          <a:bodyPr/>
+          <a:lstStyle>
+            <a:lvl1pPr marL="228600" indent="-228600" algn="l" defTabSz="914400" rtl="0" eaLnBrk="1" latinLnBrk="0" hangingPunct="1">
+              <a:lnSpc>
+                <a:spcPct val="90000"/>
+              </a:lnSpc>
+              <a:spcBef>
+                <a:spcPts val="1000"/>
+              </a:spcBef>
+              <a:buFont typeface="Arial" panose="020B0604020202020204" pitchFamily="34" charset="0"/>
+              <a:buChar char="•"/>
+              <a:defRPr sz="2800" kern="1200">
+                <a:solidFill>
+                  <a:schemeClr val="tx1"/>
+                </a:solidFill>
+                <a:latin typeface="+mn-lt"/>
+                <a:ea typeface="+mn-ea"/>
+                <a:cs typeface="+mn-cs"/>
+              </a:defRPr>
+            </a:lvl1pPr>
+            <a:lvl2pPr marL="685800" indent="-228600" algn="l" defTabSz="914400" rtl="0" eaLnBrk="1" latinLnBrk="0" hangingPunct="1">
+              <a:lnSpc>
+                <a:spcPct val="90000"/>
+              </a:lnSpc>
+              <a:spcBef>
+                <a:spcPts val="500"/>
+              </a:spcBef>
+              <a:buFont typeface="Arial" panose="020B0604020202020204" pitchFamily="34" charset="0"/>
+              <a:buChar char="•"/>
+              <a:defRPr sz="2400" kern="1200">
+                <a:solidFill>
+                  <a:schemeClr val="tx1"/>
+                </a:solidFill>
+                <a:latin typeface="+mn-lt"/>
+                <a:ea typeface="+mn-ea"/>
+                <a:cs typeface="+mn-cs"/>
+              </a:defRPr>
+            </a:lvl2pPr>
+            <a:lvl3pPr marL="1143000" indent="-228600" algn="l" defTabSz="914400" rtl="0" eaLnBrk="1" latinLnBrk="0" hangingPunct="1">
+              <a:lnSpc>
+                <a:spcPct val="90000"/>
+              </a:lnSpc>
+              <a:spcBef>
+                <a:spcPts val="500"/>
+              </a:spcBef>
+              <a:buFont typeface="Arial" panose="020B0604020202020204" pitchFamily="34" charset="0"/>
+              <a:buChar char="•"/>
+              <a:defRPr sz="2000" kern="1200">
+                <a:solidFill>
+                  <a:schemeClr val="tx1"/>
+                </a:solidFill>
+                <a:latin typeface="+mn-lt"/>
+                <a:ea typeface="+mn-ea"/>
+                <a:cs typeface="+mn-cs"/>
+              </a:defRPr>
+            </a:lvl3pPr>
+            <a:lvl4pPr marL="1600200" indent="-228600" algn="l" defTabSz="914400" rtl="0" eaLnBrk="1" latinLnBrk="0" hangingPunct="1">
+              <a:lnSpc>
+                <a:spcPct val="90000"/>
+              </a:lnSpc>
+              <a:spcBef>
+                <a:spcPts val="500"/>
+              </a:spcBef>
+              <a:buFont typeface="Arial" panose="020B0604020202020204" pitchFamily="34" charset="0"/>
+              <a:buChar char="•"/>
+              <a:defRPr sz="1800" kern="1200">
+                <a:solidFill>
+                  <a:schemeClr val="tx1"/>
+                </a:solidFill>
+                <a:latin typeface="+mn-lt"/>
+                <a:ea typeface="+mn-ea"/>
+                <a:cs typeface="+mn-cs"/>
+              </a:defRPr>
+            </a:lvl4pPr>
+            <a:lvl5pPr marL="2057400" indent="-228600" algn="l" defTabSz="914400" rtl="0" eaLnBrk="1" latinLnBrk="0" hangingPunct="1">
+              <a:lnSpc>
+                <a:spcPct val="90000"/>
+              </a:lnSpc>
+              <a:spcBef>
+                <a:spcPts val="500"/>
+              </a:spcBef>
+              <a:buFont typeface="Arial" panose="020B0604020202020204" pitchFamily="34" charset="0"/>
+              <a:buChar char="•"/>
+              <a:defRPr sz="1800" kern="1200">
+                <a:solidFill>
+                  <a:schemeClr val="tx1"/>
+                </a:solidFill>
+                <a:latin typeface="+mn-lt"/>
+                <a:ea typeface="+mn-ea"/>
+                <a:cs typeface="+mn-cs"/>
+              </a:defRPr>
+            </a:lvl5pPr>
+            <a:lvl6pPr marL="2514600" indent="-228600" algn="l" defTabSz="914400" rtl="0" eaLnBrk="1" latinLnBrk="0" hangingPunct="1">
+              <a:lnSpc>
+                <a:spcPct val="90000"/>
+              </a:lnSpc>
+              <a:spcBef>
+                <a:spcPts val="500"/>
+              </a:spcBef>
+              <a:buFont typeface="Arial" panose="020B0604020202020204" pitchFamily="34" charset="0"/>
+              <a:buChar char="•"/>
+              <a:defRPr sz="1800" kern="1200">
+                <a:solidFill>
+                  <a:schemeClr val="tx1"/>
+                </a:solidFill>
+                <a:latin typeface="+mn-lt"/>
+                <a:ea typeface="+mn-ea"/>
+                <a:cs typeface="+mn-cs"/>
+              </a:defRPr>
+            </a:lvl6pPr>
+            <a:lvl7pPr marL="2971800" indent="-228600" algn="l" defTabSz="914400" rtl="0" eaLnBrk="1" latinLnBrk="0" hangingPunct="1">
+              <a:lnSpc>
+                <a:spcPct val="90000"/>
+              </a:lnSpc>
+              <a:spcBef>
+                <a:spcPts val="500"/>
+              </a:spcBef>
+              <a:buFont typeface="Arial" panose="020B0604020202020204" pitchFamily="34" charset="0"/>
+              <a:buChar char="•"/>
+              <a:defRPr sz="1800" kern="1200">
+                <a:solidFill>
+                  <a:schemeClr val="tx1"/>
+                </a:solidFill>
+                <a:latin typeface="+mn-lt"/>
+                <a:ea typeface="+mn-ea"/>
+                <a:cs typeface="+mn-cs"/>
+              </a:defRPr>
+            </a:lvl7pPr>
+            <a:lvl8pPr marL="3429000" indent="-228600" algn="l" defTabSz="914400" rtl="0" eaLnBrk="1" latinLnBrk="0" hangingPunct="1">
+              <a:lnSpc>
+                <a:spcPct val="90000"/>
+              </a:lnSpc>
+              <a:spcBef>
+                <a:spcPts val="500"/>
+              </a:spcBef>
+              <a:buFont typeface="Arial" panose="020B0604020202020204" pitchFamily="34" charset="0"/>
+              <a:buChar char="•"/>
+              <a:defRPr sz="1800" kern="1200">
+                <a:solidFill>
+                  <a:schemeClr val="tx1"/>
+                </a:solidFill>
+                <a:latin typeface="+mn-lt"/>
+                <a:ea typeface="+mn-ea"/>
+                <a:cs typeface="+mn-cs"/>
+              </a:defRPr>
+            </a:lvl8pPr>
+            <a:lvl9pPr marL="3886200" indent="-228600" algn="l" defTabSz="914400" rtl="0" eaLnBrk="1" latinLnBrk="0" hangingPunct="1">
+              <a:lnSpc>
+                <a:spcPct val="90000"/>
+              </a:lnSpc>
+              <a:spcBef>
+                <a:spcPts val="500"/>
+              </a:spcBef>
+              <a:buFont typeface="Arial" panose="020B0604020202020204" pitchFamily="34" charset="0"/>
+              <a:buChar char="•"/>
+              <a:defRPr sz="1800" kern="1200">
+                <a:solidFill>
+                  <a:schemeClr val="tx1"/>
+                </a:solidFill>
+                <a:latin typeface="+mn-lt"/>
+                <a:ea typeface="+mn-ea"/>
+                <a:cs typeface="+mn-cs"/>
+              </a:defRPr>
+            </a:lvl9pPr>
+          </a:lstStyle>
+          <a:p>
+            <a:pPr marL="0" indent="0">
+              <a:buNone/>
+            </a:pPr>
+            <a:r>
+              <a:rPr lang="en-US" dirty="0"/>
+              <a:t>Working with EXCEL files:</a:t>
+            </a:r>
+          </a:p>
+          <a:p>
+            <a:r>
+              <a:rPr lang="en-US" dirty="0"/>
+              <a:t>The </a:t>
+            </a:r>
+            <a:r>
+              <a:rPr lang="en-US" dirty="0" err="1"/>
+              <a:t>openpyxl</a:t>
+            </a:r>
+            <a:r>
+              <a:rPr lang="en-US" dirty="0"/>
+              <a:t> package can also be used to create visualizations. </a:t>
+            </a:r>
+          </a:p>
+        </p:txBody>
+      </p:sp>
+      <p:pic>
+        <p:nvPicPr>
+          <p:cNvPr id="4" name="Picture 3">
+            <a:extLst>
+              <a:ext uri="{FF2B5EF4-FFF2-40B4-BE49-F238E27FC236}">
+                <a16:creationId xmlns:a16="http://schemas.microsoft.com/office/drawing/2014/main" id="{5AD96005-8CD6-481F-BB3B-E7241A5C680E}"/>
+              </a:ext>
+            </a:extLst>
+          </p:cNvPr>
+          <p:cNvPicPr>
+            <a:picLocks noChangeAspect="1"/>
+          </p:cNvPicPr>
+          <p:nvPr/>
+        </p:nvPicPr>
+        <p:blipFill>
+          <a:blip r:embed="rId2">
+            <a:extLst>
+              <a:ext uri="{28A0092B-C50C-407E-A947-70E740481C1C}">
+                <a14:useLocalDpi xmlns:a14="http://schemas.microsoft.com/office/drawing/2010/main" val="0"/>
+              </a:ext>
+            </a:extLst>
+          </a:blip>
+          <a:stretch>
+            <a:fillRect/>
+          </a:stretch>
+        </p:blipFill>
+        <p:spPr>
+          <a:xfrm>
+            <a:off x="377855" y="3645156"/>
+            <a:ext cx="4998979" cy="2906563"/>
+          </a:xfrm>
+          <a:prstGeom prst="rect">
+            <a:avLst/>
+          </a:prstGeom>
+        </p:spPr>
+      </p:pic>
+      <p:pic>
+        <p:nvPicPr>
+          <p:cNvPr id="5" name="Picture 4">
+            <a:extLst>
+              <a:ext uri="{FF2B5EF4-FFF2-40B4-BE49-F238E27FC236}">
+                <a16:creationId xmlns:a16="http://schemas.microsoft.com/office/drawing/2014/main" id="{09EDB81F-1611-4C53-A7FA-CD96D79743DF}"/>
+              </a:ext>
+            </a:extLst>
+          </p:cNvPr>
+          <p:cNvPicPr>
+            <a:picLocks noChangeAspect="1"/>
+          </p:cNvPicPr>
+          <p:nvPr/>
+        </p:nvPicPr>
+        <p:blipFill>
+          <a:blip r:embed="rId3">
+            <a:extLst>
+              <a:ext uri="{28A0092B-C50C-407E-A947-70E740481C1C}">
+                <a14:useLocalDpi xmlns:a14="http://schemas.microsoft.com/office/drawing/2010/main" val="0"/>
+              </a:ext>
+            </a:extLst>
+          </a:blip>
+          <a:stretch>
+            <a:fillRect/>
+          </a:stretch>
+        </p:blipFill>
+        <p:spPr>
+          <a:xfrm>
+            <a:off x="6815168" y="1599227"/>
+            <a:ext cx="4787986" cy="4952492"/>
+          </a:xfrm>
+          <a:prstGeom prst="rect">
+            <a:avLst/>
+          </a:prstGeom>
+        </p:spPr>
+      </p:pic>
+    </p:spTree>
+    <p:extLst>
+      <p:ext uri="{BB962C8B-B14F-4D97-AF65-F5344CB8AC3E}">
+        <p14:creationId xmlns:p14="http://schemas.microsoft.com/office/powerpoint/2010/main" val="2652478011"/>
+      </p:ext>
+    </p:extLst>
+  </p:cSld>
+  <p:clrMapOvr>
+    <a:masterClrMapping/>
+  </p:clrMapOvr>
+</p:sld>
+</file>
+
+<file path=ppt/slides/slide14.xml><?xml version="1.0" encoding="utf-8"?>
+<p:sld xmlns:a="http://schemas.openxmlformats.org/drawingml/2006/main" xmlns:r="http://schemas.openxmlformats.org/officeDocument/2006/relationships" xmlns:p="http://schemas.openxmlformats.org/presentationml/2006/main">
+  <p:cSld>
+    <p:spTree>
+      <p:nvGrpSpPr>
+        <p:cNvPr id="1" name=""/>
+        <p:cNvGrpSpPr/>
+        <p:nvPr/>
+      </p:nvGrpSpPr>
+      <p:grpSpPr>
+        <a:xfrm>
+          <a:off x="0" y="0"/>
+          <a:ext cx="0" cy="0"/>
+          <a:chOff x="0" y="0"/>
+          <a:chExt cx="0" cy="0"/>
+        </a:xfrm>
+      </p:grpSpPr>
+      <p:sp>
+        <p:nvSpPr>
+          <p:cNvPr id="2" name="Subtitle 2">
+            <a:extLst>
+              <a:ext uri="{FF2B5EF4-FFF2-40B4-BE49-F238E27FC236}">
+                <a16:creationId xmlns:a16="http://schemas.microsoft.com/office/drawing/2014/main" id="{7B3CA329-2DE7-4978-8C9C-3E496BBD86E0}"/>
+              </a:ext>
+            </a:extLst>
+          </p:cNvPr>
+          <p:cNvSpPr txBox="1">
+            <a:spLocks/>
+          </p:cNvSpPr>
+          <p:nvPr/>
+        </p:nvSpPr>
+        <p:spPr>
+          <a:xfrm>
+            <a:off x="445442" y="871010"/>
+            <a:ext cx="10616135" cy="2742201"/>
+          </a:xfrm>
+          <a:prstGeom prst="rect">
+            <a:avLst/>
+          </a:prstGeom>
+        </p:spPr>
+        <p:txBody>
+          <a:bodyPr/>
+          <a:lstStyle>
+            <a:lvl1pPr marL="228600" indent="-228600" algn="l" defTabSz="914400" rtl="0" eaLnBrk="1" latinLnBrk="0" hangingPunct="1">
+              <a:lnSpc>
+                <a:spcPct val="90000"/>
+              </a:lnSpc>
+              <a:spcBef>
+                <a:spcPts val="1000"/>
+              </a:spcBef>
+              <a:buFont typeface="Arial" panose="020B0604020202020204" pitchFamily="34" charset="0"/>
+              <a:buChar char="•"/>
+              <a:defRPr sz="2800" kern="1200">
+                <a:solidFill>
+                  <a:schemeClr val="tx1"/>
+                </a:solidFill>
+                <a:latin typeface="+mn-lt"/>
+                <a:ea typeface="+mn-ea"/>
+                <a:cs typeface="+mn-cs"/>
+              </a:defRPr>
+            </a:lvl1pPr>
+            <a:lvl2pPr marL="685800" indent="-228600" algn="l" defTabSz="914400" rtl="0" eaLnBrk="1" latinLnBrk="0" hangingPunct="1">
+              <a:lnSpc>
+                <a:spcPct val="90000"/>
+              </a:lnSpc>
+              <a:spcBef>
+                <a:spcPts val="500"/>
+              </a:spcBef>
+              <a:buFont typeface="Arial" panose="020B0604020202020204" pitchFamily="34" charset="0"/>
+              <a:buChar char="•"/>
+              <a:defRPr sz="2400" kern="1200">
+                <a:solidFill>
+                  <a:schemeClr val="tx1"/>
+                </a:solidFill>
+                <a:latin typeface="+mn-lt"/>
+                <a:ea typeface="+mn-ea"/>
+                <a:cs typeface="+mn-cs"/>
+              </a:defRPr>
+            </a:lvl2pPr>
+            <a:lvl3pPr marL="1143000" indent="-228600" algn="l" defTabSz="914400" rtl="0" eaLnBrk="1" latinLnBrk="0" hangingPunct="1">
+              <a:lnSpc>
+                <a:spcPct val="90000"/>
+              </a:lnSpc>
+              <a:spcBef>
+                <a:spcPts val="500"/>
+              </a:spcBef>
+              <a:buFont typeface="Arial" panose="020B0604020202020204" pitchFamily="34" charset="0"/>
+              <a:buChar char="•"/>
+              <a:defRPr sz="2000" kern="1200">
+                <a:solidFill>
+                  <a:schemeClr val="tx1"/>
+                </a:solidFill>
+                <a:latin typeface="+mn-lt"/>
+                <a:ea typeface="+mn-ea"/>
+                <a:cs typeface="+mn-cs"/>
+              </a:defRPr>
+            </a:lvl3pPr>
+            <a:lvl4pPr marL="1600200" indent="-228600" algn="l" defTabSz="914400" rtl="0" eaLnBrk="1" latinLnBrk="0" hangingPunct="1">
+              <a:lnSpc>
+                <a:spcPct val="90000"/>
+              </a:lnSpc>
+              <a:spcBef>
+                <a:spcPts val="500"/>
+              </a:spcBef>
+              <a:buFont typeface="Arial" panose="020B0604020202020204" pitchFamily="34" charset="0"/>
+              <a:buChar char="•"/>
+              <a:defRPr sz="1800" kern="1200">
+                <a:solidFill>
+                  <a:schemeClr val="tx1"/>
+                </a:solidFill>
+                <a:latin typeface="+mn-lt"/>
+                <a:ea typeface="+mn-ea"/>
+                <a:cs typeface="+mn-cs"/>
+              </a:defRPr>
+            </a:lvl4pPr>
+            <a:lvl5pPr marL="2057400" indent="-228600" algn="l" defTabSz="914400" rtl="0" eaLnBrk="1" latinLnBrk="0" hangingPunct="1">
+              <a:lnSpc>
+                <a:spcPct val="90000"/>
+              </a:lnSpc>
+              <a:spcBef>
+                <a:spcPts val="500"/>
+              </a:spcBef>
+              <a:buFont typeface="Arial" panose="020B0604020202020204" pitchFamily="34" charset="0"/>
+              <a:buChar char="•"/>
+              <a:defRPr sz="1800" kern="1200">
+                <a:solidFill>
+                  <a:schemeClr val="tx1"/>
+                </a:solidFill>
+                <a:latin typeface="+mn-lt"/>
+                <a:ea typeface="+mn-ea"/>
+                <a:cs typeface="+mn-cs"/>
+              </a:defRPr>
+            </a:lvl5pPr>
+            <a:lvl6pPr marL="2514600" indent="-228600" algn="l" defTabSz="914400" rtl="0" eaLnBrk="1" latinLnBrk="0" hangingPunct="1">
+              <a:lnSpc>
+                <a:spcPct val="90000"/>
+              </a:lnSpc>
+              <a:spcBef>
+                <a:spcPts val="500"/>
+              </a:spcBef>
+              <a:buFont typeface="Arial" panose="020B0604020202020204" pitchFamily="34" charset="0"/>
+              <a:buChar char="•"/>
+              <a:defRPr sz="1800" kern="1200">
+                <a:solidFill>
+                  <a:schemeClr val="tx1"/>
+                </a:solidFill>
+                <a:latin typeface="+mn-lt"/>
+                <a:ea typeface="+mn-ea"/>
+                <a:cs typeface="+mn-cs"/>
+              </a:defRPr>
+            </a:lvl6pPr>
+            <a:lvl7pPr marL="2971800" indent="-228600" algn="l" defTabSz="914400" rtl="0" eaLnBrk="1" latinLnBrk="0" hangingPunct="1">
+              <a:lnSpc>
+                <a:spcPct val="90000"/>
+              </a:lnSpc>
+              <a:spcBef>
+                <a:spcPts val="500"/>
+              </a:spcBef>
+              <a:buFont typeface="Arial" panose="020B0604020202020204" pitchFamily="34" charset="0"/>
+              <a:buChar char="•"/>
+              <a:defRPr sz="1800" kern="1200">
+                <a:solidFill>
+                  <a:schemeClr val="tx1"/>
+                </a:solidFill>
+                <a:latin typeface="+mn-lt"/>
+                <a:ea typeface="+mn-ea"/>
+                <a:cs typeface="+mn-cs"/>
+              </a:defRPr>
+            </a:lvl7pPr>
+            <a:lvl8pPr marL="3429000" indent="-228600" algn="l" defTabSz="914400" rtl="0" eaLnBrk="1" latinLnBrk="0" hangingPunct="1">
+              <a:lnSpc>
+                <a:spcPct val="90000"/>
+              </a:lnSpc>
+              <a:spcBef>
+                <a:spcPts val="500"/>
+              </a:spcBef>
+              <a:buFont typeface="Arial" panose="020B0604020202020204" pitchFamily="34" charset="0"/>
+              <a:buChar char="•"/>
+              <a:defRPr sz="1800" kern="1200">
+                <a:solidFill>
+                  <a:schemeClr val="tx1"/>
+                </a:solidFill>
+                <a:latin typeface="+mn-lt"/>
+                <a:ea typeface="+mn-ea"/>
+                <a:cs typeface="+mn-cs"/>
+              </a:defRPr>
+            </a:lvl8pPr>
+            <a:lvl9pPr marL="3886200" indent="-228600" algn="l" defTabSz="914400" rtl="0" eaLnBrk="1" latinLnBrk="0" hangingPunct="1">
+              <a:lnSpc>
+                <a:spcPct val="90000"/>
+              </a:lnSpc>
+              <a:spcBef>
+                <a:spcPts val="500"/>
+              </a:spcBef>
+              <a:buFont typeface="Arial" panose="020B0604020202020204" pitchFamily="34" charset="0"/>
+              <a:buChar char="•"/>
+              <a:defRPr sz="1800" kern="1200">
+                <a:solidFill>
+                  <a:schemeClr val="tx1"/>
+                </a:solidFill>
+                <a:latin typeface="+mn-lt"/>
+                <a:ea typeface="+mn-ea"/>
+                <a:cs typeface="+mn-cs"/>
+              </a:defRPr>
+            </a:lvl9pPr>
+          </a:lstStyle>
+          <a:p>
+            <a:pPr marL="0" indent="0">
+              <a:buNone/>
+            </a:pPr>
+            <a:r>
+              <a:rPr lang="en-US" dirty="0"/>
+              <a:t>Working with EXCEL files:</a:t>
+            </a:r>
+          </a:p>
+          <a:p>
+            <a:r>
+              <a:rPr lang="en-US" dirty="0"/>
+              <a:t>With the help of </a:t>
+            </a:r>
+            <a:r>
+              <a:rPr lang="en-US" dirty="0" err="1"/>
+              <a:t>openpyxl</a:t>
+            </a:r>
+            <a:r>
+              <a:rPr lang="en-US" dirty="0"/>
+              <a:t> we can create many other charts in excel</a:t>
+            </a:r>
+          </a:p>
+          <a:p>
+            <a:r>
+              <a:rPr lang="en-US" dirty="0"/>
+              <a:t>Such as </a:t>
+            </a:r>
+          </a:p>
+          <a:p>
+            <a:pPr lvl="1"/>
+            <a:r>
+              <a:rPr lang="en-US" dirty="0" err="1"/>
+              <a:t>Barcharts</a:t>
+            </a:r>
+            <a:endParaRPr lang="en-US" dirty="0"/>
+          </a:p>
+          <a:p>
+            <a:pPr lvl="1"/>
+            <a:r>
+              <a:rPr lang="en-US" dirty="0"/>
+              <a:t>Bubble charts</a:t>
+            </a:r>
+          </a:p>
+          <a:p>
+            <a:pPr lvl="1"/>
+            <a:r>
+              <a:rPr lang="en-US" dirty="0"/>
+              <a:t>Line charts</a:t>
+            </a:r>
+          </a:p>
+        </p:txBody>
+      </p:sp>
+      <p:pic>
+        <p:nvPicPr>
+          <p:cNvPr id="3" name="Picture 2">
+            <a:extLst>
+              <a:ext uri="{FF2B5EF4-FFF2-40B4-BE49-F238E27FC236}">
+                <a16:creationId xmlns:a16="http://schemas.microsoft.com/office/drawing/2014/main" id="{DFDB732F-CEDB-4DB8-A0BA-CF2407BECD3B}"/>
+              </a:ext>
+            </a:extLst>
+          </p:cNvPr>
+          <p:cNvPicPr>
+            <a:picLocks noChangeAspect="1"/>
+          </p:cNvPicPr>
+          <p:nvPr/>
+        </p:nvPicPr>
+        <p:blipFill>
+          <a:blip r:embed="rId2">
+            <a:extLst>
+              <a:ext uri="{28A0092B-C50C-407E-A947-70E740481C1C}">
+                <a14:useLocalDpi xmlns:a14="http://schemas.microsoft.com/office/drawing/2010/main" val="0"/>
+              </a:ext>
+            </a:extLst>
+          </a:blip>
+          <a:stretch>
+            <a:fillRect/>
+          </a:stretch>
+        </p:blipFill>
+        <p:spPr>
+          <a:xfrm>
+            <a:off x="4683001" y="3429000"/>
+            <a:ext cx="6746746" cy="2195346"/>
+          </a:xfrm>
+          <a:prstGeom prst="rect">
+            <a:avLst/>
+          </a:prstGeom>
+        </p:spPr>
+      </p:pic>
+      <p:pic>
+        <p:nvPicPr>
+          <p:cNvPr id="4" name="Picture 3">
+            <a:extLst>
+              <a:ext uri="{FF2B5EF4-FFF2-40B4-BE49-F238E27FC236}">
+                <a16:creationId xmlns:a16="http://schemas.microsoft.com/office/drawing/2014/main" id="{64675F81-CA3E-4F65-9B8F-BAAD72E47108}"/>
+              </a:ext>
+            </a:extLst>
+          </p:cNvPr>
+          <p:cNvPicPr>
+            <a:picLocks noChangeAspect="1"/>
+          </p:cNvPicPr>
+          <p:nvPr/>
+        </p:nvPicPr>
+        <p:blipFill>
+          <a:blip r:embed="rId3">
+            <a:extLst>
+              <a:ext uri="{28A0092B-C50C-407E-A947-70E740481C1C}">
+                <a14:useLocalDpi xmlns:a14="http://schemas.microsoft.com/office/drawing/2010/main" val="0"/>
+              </a:ext>
+            </a:extLst>
+          </a:blip>
+          <a:stretch>
+            <a:fillRect/>
+          </a:stretch>
+        </p:blipFill>
+        <p:spPr>
+          <a:xfrm>
+            <a:off x="5499864" y="2627161"/>
+            <a:ext cx="5113020" cy="449580"/>
+          </a:xfrm>
+          <a:prstGeom prst="rect">
+            <a:avLst/>
+          </a:prstGeom>
+        </p:spPr>
+      </p:pic>
+    </p:spTree>
+    <p:extLst>
+      <p:ext uri="{BB962C8B-B14F-4D97-AF65-F5344CB8AC3E}">
+        <p14:creationId xmlns:p14="http://schemas.microsoft.com/office/powerpoint/2010/main" val="3877487335"/>
+      </p:ext>
+    </p:extLst>
+  </p:cSld>
+  <p:clrMapOvr>
+    <a:masterClrMapping/>
+  </p:clrMapOvr>
+</p:sld>
+</file>
+
+<file path=ppt/slides/slide15.xml><?xml version="1.0" encoding="utf-8"?>
+<p:sld xmlns:a="http://schemas.openxmlformats.org/drawingml/2006/main" xmlns:r="http://schemas.openxmlformats.org/officeDocument/2006/relationships" xmlns:p="http://schemas.openxmlformats.org/presentationml/2006/main">
+  <p:cSld>
+    <p:spTree>
+      <p:nvGrpSpPr>
+        <p:cNvPr id="1" name=""/>
+        <p:cNvGrpSpPr/>
+        <p:nvPr/>
+      </p:nvGrpSpPr>
+      <p:grpSpPr>
+        <a:xfrm>
+          <a:off x="0" y="0"/>
+          <a:ext cx="0" cy="0"/>
+          <a:chOff x="0" y="0"/>
+          <a:chExt cx="0" cy="0"/>
+        </a:xfrm>
+      </p:grpSpPr>
+      <p:sp>
+        <p:nvSpPr>
+          <p:cNvPr id="3" name="Title 2">
+            <a:extLst>
+              <a:ext uri="{FF2B5EF4-FFF2-40B4-BE49-F238E27FC236}">
+                <a16:creationId xmlns:a16="http://schemas.microsoft.com/office/drawing/2014/main" id="{5E21159A-2375-4B11-90AB-88419AD4C1F4}"/>
+              </a:ext>
+            </a:extLst>
+          </p:cNvPr>
+          <p:cNvSpPr>
+            <a:spLocks noGrp="1"/>
+          </p:cNvSpPr>
+          <p:nvPr>
+            <p:ph type="ctrTitle"/>
+          </p:nvPr>
+        </p:nvSpPr>
+        <p:spPr/>
+        <p:txBody>
+          <a:bodyPr/>
+          <a:lstStyle/>
+          <a:p>
+            <a:r>
+              <a:rPr lang="en-US" b="1" dirty="0"/>
+              <a:t>Working with advanced python packages</a:t>
+            </a:r>
+            <a:endParaRPr lang="en-IN" b="1" dirty="0"/>
+          </a:p>
+        </p:txBody>
+      </p:sp>
+      <p:sp>
+        <p:nvSpPr>
+          <p:cNvPr id="4" name="Subtitle 3">
+            <a:extLst>
+              <a:ext uri="{FF2B5EF4-FFF2-40B4-BE49-F238E27FC236}">
+                <a16:creationId xmlns:a16="http://schemas.microsoft.com/office/drawing/2014/main" id="{C4C67681-C49B-4EB1-BA47-1D876286E6E5}"/>
+              </a:ext>
+            </a:extLst>
+          </p:cNvPr>
+          <p:cNvSpPr>
+            <a:spLocks noGrp="1"/>
+          </p:cNvSpPr>
+          <p:nvPr>
+            <p:ph type="subTitle" idx="1"/>
+          </p:nvPr>
+        </p:nvSpPr>
+        <p:spPr/>
+        <p:txBody>
+          <a:bodyPr/>
+          <a:lstStyle/>
+          <a:p>
+            <a:r>
+              <a:rPr lang="en-US" dirty="0" err="1"/>
+              <a:t>Numpy</a:t>
+            </a:r>
+            <a:r>
+              <a:rPr lang="en-US" dirty="0"/>
+              <a:t>, pandas, matplotlib, </a:t>
+            </a:r>
+            <a:r>
+              <a:rPr lang="en-US" dirty="0" err="1"/>
+              <a:t>seabourn</a:t>
+            </a:r>
+            <a:r>
+              <a:rPr lang="en-US" dirty="0"/>
+              <a:t> etc.</a:t>
+            </a:r>
+            <a:endParaRPr lang="en-IN" dirty="0"/>
+          </a:p>
+        </p:txBody>
+      </p:sp>
+    </p:spTree>
+    <p:extLst>
+      <p:ext uri="{BB962C8B-B14F-4D97-AF65-F5344CB8AC3E}">
+        <p14:creationId xmlns:p14="http://schemas.microsoft.com/office/powerpoint/2010/main" val="113316735"/>
+      </p:ext>
+    </p:extLst>
+  </p:cSld>
+  <p:clrMapOvr>
+    <a:masterClrMapping/>
+  </p:clrMapOvr>
+</p:sld>
+</file>
+
+<file path=ppt/slides/slide16.xml><?xml version="1.0" encoding="utf-8"?>
+<p:sld xmlns:a="http://schemas.openxmlformats.org/drawingml/2006/main" xmlns:r="http://schemas.openxmlformats.org/officeDocument/2006/relationships" xmlns:p="http://schemas.openxmlformats.org/presentationml/2006/main">
+  <p:cSld>
+    <p:spTree>
+      <p:nvGrpSpPr>
+        <p:cNvPr id="1" name=""/>
+        <p:cNvGrpSpPr/>
+        <p:nvPr/>
+      </p:nvGrpSpPr>
+      <p:grpSpPr>
+        <a:xfrm>
+          <a:off x="0" y="0"/>
+          <a:ext cx="0" cy="0"/>
+          <a:chOff x="0" y="0"/>
+          <a:chExt cx="0" cy="0"/>
+        </a:xfrm>
+      </p:grpSpPr>
+      <p:sp>
+        <p:nvSpPr>
+          <p:cNvPr id="2" name="Title 1">
+            <a:extLst>
+              <a:ext uri="{FF2B5EF4-FFF2-40B4-BE49-F238E27FC236}">
+                <a16:creationId xmlns:a16="http://schemas.microsoft.com/office/drawing/2014/main" id="{5FDA7330-6842-417E-B0E4-E8167DB96706}"/>
+              </a:ext>
+            </a:extLst>
+          </p:cNvPr>
+          <p:cNvSpPr>
+            <a:spLocks noGrp="1"/>
+          </p:cNvSpPr>
+          <p:nvPr>
+            <p:ph type="ctrTitle"/>
+          </p:nvPr>
+        </p:nvSpPr>
+        <p:spPr>
+          <a:xfrm>
+            <a:off x="1524000" y="963151"/>
+            <a:ext cx="9144000" cy="795214"/>
+          </a:xfrm>
+        </p:spPr>
+        <p:txBody>
+          <a:bodyPr/>
+          <a:lstStyle/>
+          <a:p>
+            <a:r>
+              <a:rPr lang="en-US" dirty="0" err="1"/>
+              <a:t>Numpy</a:t>
+            </a:r>
+            <a:endParaRPr lang="en-IN" dirty="0"/>
+          </a:p>
+        </p:txBody>
+      </p:sp>
+      <p:sp>
+        <p:nvSpPr>
+          <p:cNvPr id="3" name="Subtitle 2">
+            <a:extLst>
+              <a:ext uri="{FF2B5EF4-FFF2-40B4-BE49-F238E27FC236}">
+                <a16:creationId xmlns:a16="http://schemas.microsoft.com/office/drawing/2014/main" id="{F0C04518-91C3-4C70-995D-4F3C6559A4DD}"/>
+              </a:ext>
+            </a:extLst>
+          </p:cNvPr>
+          <p:cNvSpPr>
+            <a:spLocks noGrp="1"/>
+          </p:cNvSpPr>
+          <p:nvPr>
+            <p:ph type="subTitle" idx="1"/>
+          </p:nvPr>
+        </p:nvSpPr>
+        <p:spPr>
+          <a:xfrm>
+            <a:off x="1524000" y="2166739"/>
+            <a:ext cx="9144000" cy="3124354"/>
+          </a:xfrm>
+        </p:spPr>
+        <p:txBody>
+          <a:bodyPr/>
+          <a:lstStyle/>
+          <a:p>
+            <a:pPr marL="342900" indent="-342900" algn="l">
+              <a:buFont typeface="Arial" panose="020B0604020202020204" pitchFamily="34" charset="0"/>
+              <a:buChar char="•"/>
+            </a:pPr>
+            <a:r>
+              <a:rPr lang="en-US" dirty="0"/>
+              <a:t>NumPy is a Python library used for working with arrays.</a:t>
+            </a:r>
+          </a:p>
+          <a:p>
+            <a:pPr marL="342900" indent="-342900" algn="l">
+              <a:buFont typeface="Arial" panose="020B0604020202020204" pitchFamily="34" charset="0"/>
+              <a:buChar char="•"/>
+            </a:pPr>
+            <a:r>
+              <a:rPr lang="en-US" dirty="0"/>
+              <a:t>It also has functions for working in domain of linear algebra, </a:t>
+            </a:r>
+            <a:r>
+              <a:rPr lang="en-US" dirty="0" err="1"/>
+              <a:t>fourier</a:t>
+            </a:r>
+            <a:r>
+              <a:rPr lang="en-US" dirty="0"/>
+              <a:t> transform, and matrices.</a:t>
+            </a:r>
+          </a:p>
+          <a:p>
+            <a:pPr marL="342900" indent="-342900" algn="l">
+              <a:buFont typeface="Arial" panose="020B0604020202020204" pitchFamily="34" charset="0"/>
+              <a:buChar char="•"/>
+            </a:pPr>
+            <a:r>
+              <a:rPr lang="en-US" dirty="0"/>
+              <a:t>NumPy was created in 2005 by Travis Oliphant. It is an open source project and you can use it freely.</a:t>
+            </a:r>
+          </a:p>
+          <a:p>
+            <a:pPr marL="342900" indent="-342900" algn="l">
+              <a:buFont typeface="Arial" panose="020B0604020202020204" pitchFamily="34" charset="0"/>
+              <a:buChar char="•"/>
+            </a:pPr>
+            <a:r>
+              <a:rPr lang="en-US" dirty="0"/>
+              <a:t>NumPy stands for Numerical Python.</a:t>
+            </a:r>
+          </a:p>
+          <a:p>
+            <a:pPr marL="342900" indent="-342900" algn="l">
+              <a:buFont typeface="Arial" panose="020B0604020202020204" pitchFamily="34" charset="0"/>
+              <a:buChar char="•"/>
+            </a:pPr>
+            <a:endParaRPr lang="en-IN" dirty="0"/>
+          </a:p>
+        </p:txBody>
+      </p:sp>
+    </p:spTree>
+    <p:extLst>
+      <p:ext uri="{BB962C8B-B14F-4D97-AF65-F5344CB8AC3E}">
+        <p14:creationId xmlns:p14="http://schemas.microsoft.com/office/powerpoint/2010/main" val="1950992868"/>
+      </p:ext>
+    </p:extLst>
+  </p:cSld>
+  <p:clrMapOvr>
+    <a:masterClrMapping/>
+  </p:clrMapOvr>
+</p:sld>
+</file>
+
+<file path=ppt/slides/slide17.xml><?xml version="1.0" encoding="utf-8"?>
+<p:sld xmlns:a="http://schemas.openxmlformats.org/drawingml/2006/main" xmlns:r="http://schemas.openxmlformats.org/officeDocument/2006/relationships" xmlns:p="http://schemas.openxmlformats.org/presentationml/2006/main">
+  <p:cSld>
+    <p:spTree>
+      <p:nvGrpSpPr>
+        <p:cNvPr id="1" name=""/>
+        <p:cNvGrpSpPr/>
+        <p:nvPr/>
+      </p:nvGrpSpPr>
+      <p:grpSpPr>
+        <a:xfrm>
+          <a:off x="0" y="0"/>
+          <a:ext cx="0" cy="0"/>
+          <a:chOff x="0" y="0"/>
+          <a:chExt cx="0" cy="0"/>
+        </a:xfrm>
+      </p:grpSpPr>
+    </p:spTree>
+    <p:extLst>
+      <p:ext uri="{BB962C8B-B14F-4D97-AF65-F5344CB8AC3E}">
+        <p14:creationId xmlns:p14="http://schemas.microsoft.com/office/powerpoint/2010/main" val="2129283202"/>
       </p:ext>
     </p:extLst>
   </p:cSld>
@@ -1468,6 +3326,231 @@
           </a:prstGeom>
         </p:spPr>
       </p:pic>
+      <p:sp>
+        <p:nvSpPr>
+          <p:cNvPr id="5" name="Subtitle 2">
+            <a:extLst>
+              <a:ext uri="{FF2B5EF4-FFF2-40B4-BE49-F238E27FC236}">
+                <a16:creationId xmlns:a16="http://schemas.microsoft.com/office/drawing/2014/main" id="{3B36F201-0940-47DD-8C62-87CD7C33EFAE}"/>
+              </a:ext>
+            </a:extLst>
+          </p:cNvPr>
+          <p:cNvSpPr txBox="1">
+            <a:spLocks/>
+          </p:cNvSpPr>
+          <p:nvPr/>
+        </p:nvSpPr>
+        <p:spPr>
+          <a:xfrm>
+            <a:off x="401053" y="465221"/>
+            <a:ext cx="5694947" cy="4792579"/>
+          </a:xfrm>
+          <a:prstGeom prst="rect">
+            <a:avLst/>
+          </a:prstGeom>
+        </p:spPr>
+        <p:txBody>
+          <a:bodyPr/>
+          <a:lstStyle>
+            <a:lvl1pPr marL="228600" indent="-228600" algn="l" defTabSz="914400" rtl="0" eaLnBrk="1" latinLnBrk="0" hangingPunct="1">
+              <a:lnSpc>
+                <a:spcPct val="90000"/>
+              </a:lnSpc>
+              <a:spcBef>
+                <a:spcPts val="1000"/>
+              </a:spcBef>
+              <a:buFont typeface="Arial" panose="020B0604020202020204" pitchFamily="34" charset="0"/>
+              <a:buChar char="•"/>
+              <a:defRPr sz="2800" kern="1200">
+                <a:solidFill>
+                  <a:schemeClr val="tx1"/>
+                </a:solidFill>
+                <a:latin typeface="+mn-lt"/>
+                <a:ea typeface="+mn-ea"/>
+                <a:cs typeface="+mn-cs"/>
+              </a:defRPr>
+            </a:lvl1pPr>
+            <a:lvl2pPr marL="685800" indent="-228600" algn="l" defTabSz="914400" rtl="0" eaLnBrk="1" latinLnBrk="0" hangingPunct="1">
+              <a:lnSpc>
+                <a:spcPct val="90000"/>
+              </a:lnSpc>
+              <a:spcBef>
+                <a:spcPts val="500"/>
+              </a:spcBef>
+              <a:buFont typeface="Arial" panose="020B0604020202020204" pitchFamily="34" charset="0"/>
+              <a:buChar char="•"/>
+              <a:defRPr sz="2400" kern="1200">
+                <a:solidFill>
+                  <a:schemeClr val="tx1"/>
+                </a:solidFill>
+                <a:latin typeface="+mn-lt"/>
+                <a:ea typeface="+mn-ea"/>
+                <a:cs typeface="+mn-cs"/>
+              </a:defRPr>
+            </a:lvl2pPr>
+            <a:lvl3pPr marL="1143000" indent="-228600" algn="l" defTabSz="914400" rtl="0" eaLnBrk="1" latinLnBrk="0" hangingPunct="1">
+              <a:lnSpc>
+                <a:spcPct val="90000"/>
+              </a:lnSpc>
+              <a:spcBef>
+                <a:spcPts val="500"/>
+              </a:spcBef>
+              <a:buFont typeface="Arial" panose="020B0604020202020204" pitchFamily="34" charset="0"/>
+              <a:buChar char="•"/>
+              <a:defRPr sz="2000" kern="1200">
+                <a:solidFill>
+                  <a:schemeClr val="tx1"/>
+                </a:solidFill>
+                <a:latin typeface="+mn-lt"/>
+                <a:ea typeface="+mn-ea"/>
+                <a:cs typeface="+mn-cs"/>
+              </a:defRPr>
+            </a:lvl3pPr>
+            <a:lvl4pPr marL="1600200" indent="-228600" algn="l" defTabSz="914400" rtl="0" eaLnBrk="1" latinLnBrk="0" hangingPunct="1">
+              <a:lnSpc>
+                <a:spcPct val="90000"/>
+              </a:lnSpc>
+              <a:spcBef>
+                <a:spcPts val="500"/>
+              </a:spcBef>
+              <a:buFont typeface="Arial" panose="020B0604020202020204" pitchFamily="34" charset="0"/>
+              <a:buChar char="•"/>
+              <a:defRPr sz="1800" kern="1200">
+                <a:solidFill>
+                  <a:schemeClr val="tx1"/>
+                </a:solidFill>
+                <a:latin typeface="+mn-lt"/>
+                <a:ea typeface="+mn-ea"/>
+                <a:cs typeface="+mn-cs"/>
+              </a:defRPr>
+            </a:lvl4pPr>
+            <a:lvl5pPr marL="2057400" indent="-228600" algn="l" defTabSz="914400" rtl="0" eaLnBrk="1" latinLnBrk="0" hangingPunct="1">
+              <a:lnSpc>
+                <a:spcPct val="90000"/>
+              </a:lnSpc>
+              <a:spcBef>
+                <a:spcPts val="500"/>
+              </a:spcBef>
+              <a:buFont typeface="Arial" panose="020B0604020202020204" pitchFamily="34" charset="0"/>
+              <a:buChar char="•"/>
+              <a:defRPr sz="1800" kern="1200">
+                <a:solidFill>
+                  <a:schemeClr val="tx1"/>
+                </a:solidFill>
+                <a:latin typeface="+mn-lt"/>
+                <a:ea typeface="+mn-ea"/>
+                <a:cs typeface="+mn-cs"/>
+              </a:defRPr>
+            </a:lvl5pPr>
+            <a:lvl6pPr marL="2514600" indent="-228600" algn="l" defTabSz="914400" rtl="0" eaLnBrk="1" latinLnBrk="0" hangingPunct="1">
+              <a:lnSpc>
+                <a:spcPct val="90000"/>
+              </a:lnSpc>
+              <a:spcBef>
+                <a:spcPts val="500"/>
+              </a:spcBef>
+              <a:buFont typeface="Arial" panose="020B0604020202020204" pitchFamily="34" charset="0"/>
+              <a:buChar char="•"/>
+              <a:defRPr sz="1800" kern="1200">
+                <a:solidFill>
+                  <a:schemeClr val="tx1"/>
+                </a:solidFill>
+                <a:latin typeface="+mn-lt"/>
+                <a:ea typeface="+mn-ea"/>
+                <a:cs typeface="+mn-cs"/>
+              </a:defRPr>
+            </a:lvl6pPr>
+            <a:lvl7pPr marL="2971800" indent="-228600" algn="l" defTabSz="914400" rtl="0" eaLnBrk="1" latinLnBrk="0" hangingPunct="1">
+              <a:lnSpc>
+                <a:spcPct val="90000"/>
+              </a:lnSpc>
+              <a:spcBef>
+                <a:spcPts val="500"/>
+              </a:spcBef>
+              <a:buFont typeface="Arial" panose="020B0604020202020204" pitchFamily="34" charset="0"/>
+              <a:buChar char="•"/>
+              <a:defRPr sz="1800" kern="1200">
+                <a:solidFill>
+                  <a:schemeClr val="tx1"/>
+                </a:solidFill>
+                <a:latin typeface="+mn-lt"/>
+                <a:ea typeface="+mn-ea"/>
+                <a:cs typeface="+mn-cs"/>
+              </a:defRPr>
+            </a:lvl7pPr>
+            <a:lvl8pPr marL="3429000" indent="-228600" algn="l" defTabSz="914400" rtl="0" eaLnBrk="1" latinLnBrk="0" hangingPunct="1">
+              <a:lnSpc>
+                <a:spcPct val="90000"/>
+              </a:lnSpc>
+              <a:spcBef>
+                <a:spcPts val="500"/>
+              </a:spcBef>
+              <a:buFont typeface="Arial" panose="020B0604020202020204" pitchFamily="34" charset="0"/>
+              <a:buChar char="•"/>
+              <a:defRPr sz="1800" kern="1200">
+                <a:solidFill>
+                  <a:schemeClr val="tx1"/>
+                </a:solidFill>
+                <a:latin typeface="+mn-lt"/>
+                <a:ea typeface="+mn-ea"/>
+                <a:cs typeface="+mn-cs"/>
+              </a:defRPr>
+            </a:lvl8pPr>
+            <a:lvl9pPr marL="3886200" indent="-228600" algn="l" defTabSz="914400" rtl="0" eaLnBrk="1" latinLnBrk="0" hangingPunct="1">
+              <a:lnSpc>
+                <a:spcPct val="90000"/>
+              </a:lnSpc>
+              <a:spcBef>
+                <a:spcPts val="500"/>
+              </a:spcBef>
+              <a:buFont typeface="Arial" panose="020B0604020202020204" pitchFamily="34" charset="0"/>
+              <a:buChar char="•"/>
+              <a:defRPr sz="1800" kern="1200">
+                <a:solidFill>
+                  <a:schemeClr val="tx1"/>
+                </a:solidFill>
+                <a:latin typeface="+mn-lt"/>
+                <a:ea typeface="+mn-ea"/>
+                <a:cs typeface="+mn-cs"/>
+              </a:defRPr>
+            </a:lvl9pPr>
+          </a:lstStyle>
+          <a:p>
+            <a:pPr marL="0" indent="0">
+              <a:buNone/>
+            </a:pPr>
+            <a:r>
+              <a:rPr lang="en-US" dirty="0"/>
+              <a:t>Working with CSV files:</a:t>
+            </a:r>
+          </a:p>
+          <a:p>
+            <a:r>
+              <a:rPr lang="en-US" dirty="0"/>
+              <a:t>CSV files can be thought as a database containing some records.</a:t>
+            </a:r>
+          </a:p>
+          <a:p>
+            <a:r>
+              <a:rPr lang="en-US" dirty="0"/>
+              <a:t>We design mechanism to read data stored in CSV file using Python.</a:t>
+            </a:r>
+          </a:p>
+          <a:p>
+            <a:r>
+              <a:rPr lang="en-US" dirty="0"/>
+              <a:t>The code of the right can be used to read data stored in a CSV file named as Product.csv.</a:t>
+            </a:r>
+          </a:p>
+          <a:p>
+            <a:r>
+              <a:rPr lang="en-US" dirty="0"/>
+              <a:t>We use the import csv package. </a:t>
+            </a:r>
+            <a:endParaRPr lang="en-IN" dirty="0"/>
+          </a:p>
+        </p:txBody>
+      </p:sp>
     </p:spTree>
     <p:extLst>
       <p:ext uri="{BB962C8B-B14F-4D97-AF65-F5344CB8AC3E}">
@@ -1534,6 +3617,218 @@
           </a:prstGeom>
         </p:spPr>
       </p:pic>
+      <p:sp>
+        <p:nvSpPr>
+          <p:cNvPr id="3" name="Subtitle 2">
+            <a:extLst>
+              <a:ext uri="{FF2B5EF4-FFF2-40B4-BE49-F238E27FC236}">
+                <a16:creationId xmlns:a16="http://schemas.microsoft.com/office/drawing/2014/main" id="{DC8EC60D-AD28-4B7B-8953-68F4531ABC6E}"/>
+              </a:ext>
+            </a:extLst>
+          </p:cNvPr>
+          <p:cNvSpPr txBox="1">
+            <a:spLocks/>
+          </p:cNvSpPr>
+          <p:nvPr/>
+        </p:nvSpPr>
+        <p:spPr>
+          <a:xfrm>
+            <a:off x="401053" y="465221"/>
+            <a:ext cx="5694947" cy="4792579"/>
+          </a:xfrm>
+          <a:prstGeom prst="rect">
+            <a:avLst/>
+          </a:prstGeom>
+        </p:spPr>
+        <p:txBody>
+          <a:bodyPr/>
+          <a:lstStyle>
+            <a:lvl1pPr marL="228600" indent="-228600" algn="l" defTabSz="914400" rtl="0" eaLnBrk="1" latinLnBrk="0" hangingPunct="1">
+              <a:lnSpc>
+                <a:spcPct val="90000"/>
+              </a:lnSpc>
+              <a:spcBef>
+                <a:spcPts val="1000"/>
+              </a:spcBef>
+              <a:buFont typeface="Arial" panose="020B0604020202020204" pitchFamily="34" charset="0"/>
+              <a:buChar char="•"/>
+              <a:defRPr sz="2800" kern="1200">
+                <a:solidFill>
+                  <a:schemeClr val="tx1"/>
+                </a:solidFill>
+                <a:latin typeface="+mn-lt"/>
+                <a:ea typeface="+mn-ea"/>
+                <a:cs typeface="+mn-cs"/>
+              </a:defRPr>
+            </a:lvl1pPr>
+            <a:lvl2pPr marL="685800" indent="-228600" algn="l" defTabSz="914400" rtl="0" eaLnBrk="1" latinLnBrk="0" hangingPunct="1">
+              <a:lnSpc>
+                <a:spcPct val="90000"/>
+              </a:lnSpc>
+              <a:spcBef>
+                <a:spcPts val="500"/>
+              </a:spcBef>
+              <a:buFont typeface="Arial" panose="020B0604020202020204" pitchFamily="34" charset="0"/>
+              <a:buChar char="•"/>
+              <a:defRPr sz="2400" kern="1200">
+                <a:solidFill>
+                  <a:schemeClr val="tx1"/>
+                </a:solidFill>
+                <a:latin typeface="+mn-lt"/>
+                <a:ea typeface="+mn-ea"/>
+                <a:cs typeface="+mn-cs"/>
+              </a:defRPr>
+            </a:lvl2pPr>
+            <a:lvl3pPr marL="1143000" indent="-228600" algn="l" defTabSz="914400" rtl="0" eaLnBrk="1" latinLnBrk="0" hangingPunct="1">
+              <a:lnSpc>
+                <a:spcPct val="90000"/>
+              </a:lnSpc>
+              <a:spcBef>
+                <a:spcPts val="500"/>
+              </a:spcBef>
+              <a:buFont typeface="Arial" panose="020B0604020202020204" pitchFamily="34" charset="0"/>
+              <a:buChar char="•"/>
+              <a:defRPr sz="2000" kern="1200">
+                <a:solidFill>
+                  <a:schemeClr val="tx1"/>
+                </a:solidFill>
+                <a:latin typeface="+mn-lt"/>
+                <a:ea typeface="+mn-ea"/>
+                <a:cs typeface="+mn-cs"/>
+              </a:defRPr>
+            </a:lvl3pPr>
+            <a:lvl4pPr marL="1600200" indent="-228600" algn="l" defTabSz="914400" rtl="0" eaLnBrk="1" latinLnBrk="0" hangingPunct="1">
+              <a:lnSpc>
+                <a:spcPct val="90000"/>
+              </a:lnSpc>
+              <a:spcBef>
+                <a:spcPts val="500"/>
+              </a:spcBef>
+              <a:buFont typeface="Arial" panose="020B0604020202020204" pitchFamily="34" charset="0"/>
+              <a:buChar char="•"/>
+              <a:defRPr sz="1800" kern="1200">
+                <a:solidFill>
+                  <a:schemeClr val="tx1"/>
+                </a:solidFill>
+                <a:latin typeface="+mn-lt"/>
+                <a:ea typeface="+mn-ea"/>
+                <a:cs typeface="+mn-cs"/>
+              </a:defRPr>
+            </a:lvl4pPr>
+            <a:lvl5pPr marL="2057400" indent="-228600" algn="l" defTabSz="914400" rtl="0" eaLnBrk="1" latinLnBrk="0" hangingPunct="1">
+              <a:lnSpc>
+                <a:spcPct val="90000"/>
+              </a:lnSpc>
+              <a:spcBef>
+                <a:spcPts val="500"/>
+              </a:spcBef>
+              <a:buFont typeface="Arial" panose="020B0604020202020204" pitchFamily="34" charset="0"/>
+              <a:buChar char="•"/>
+              <a:defRPr sz="1800" kern="1200">
+                <a:solidFill>
+                  <a:schemeClr val="tx1"/>
+                </a:solidFill>
+                <a:latin typeface="+mn-lt"/>
+                <a:ea typeface="+mn-ea"/>
+                <a:cs typeface="+mn-cs"/>
+              </a:defRPr>
+            </a:lvl5pPr>
+            <a:lvl6pPr marL="2514600" indent="-228600" algn="l" defTabSz="914400" rtl="0" eaLnBrk="1" latinLnBrk="0" hangingPunct="1">
+              <a:lnSpc>
+                <a:spcPct val="90000"/>
+              </a:lnSpc>
+              <a:spcBef>
+                <a:spcPts val="500"/>
+              </a:spcBef>
+              <a:buFont typeface="Arial" panose="020B0604020202020204" pitchFamily="34" charset="0"/>
+              <a:buChar char="•"/>
+              <a:defRPr sz="1800" kern="1200">
+                <a:solidFill>
+                  <a:schemeClr val="tx1"/>
+                </a:solidFill>
+                <a:latin typeface="+mn-lt"/>
+                <a:ea typeface="+mn-ea"/>
+                <a:cs typeface="+mn-cs"/>
+              </a:defRPr>
+            </a:lvl6pPr>
+            <a:lvl7pPr marL="2971800" indent="-228600" algn="l" defTabSz="914400" rtl="0" eaLnBrk="1" latinLnBrk="0" hangingPunct="1">
+              <a:lnSpc>
+                <a:spcPct val="90000"/>
+              </a:lnSpc>
+              <a:spcBef>
+                <a:spcPts val="500"/>
+              </a:spcBef>
+              <a:buFont typeface="Arial" panose="020B0604020202020204" pitchFamily="34" charset="0"/>
+              <a:buChar char="•"/>
+              <a:defRPr sz="1800" kern="1200">
+                <a:solidFill>
+                  <a:schemeClr val="tx1"/>
+                </a:solidFill>
+                <a:latin typeface="+mn-lt"/>
+                <a:ea typeface="+mn-ea"/>
+                <a:cs typeface="+mn-cs"/>
+              </a:defRPr>
+            </a:lvl7pPr>
+            <a:lvl8pPr marL="3429000" indent="-228600" algn="l" defTabSz="914400" rtl="0" eaLnBrk="1" latinLnBrk="0" hangingPunct="1">
+              <a:lnSpc>
+                <a:spcPct val="90000"/>
+              </a:lnSpc>
+              <a:spcBef>
+                <a:spcPts val="500"/>
+              </a:spcBef>
+              <a:buFont typeface="Arial" panose="020B0604020202020204" pitchFamily="34" charset="0"/>
+              <a:buChar char="•"/>
+              <a:defRPr sz="1800" kern="1200">
+                <a:solidFill>
+                  <a:schemeClr val="tx1"/>
+                </a:solidFill>
+                <a:latin typeface="+mn-lt"/>
+                <a:ea typeface="+mn-ea"/>
+                <a:cs typeface="+mn-cs"/>
+              </a:defRPr>
+            </a:lvl8pPr>
+            <a:lvl9pPr marL="3886200" indent="-228600" algn="l" defTabSz="914400" rtl="0" eaLnBrk="1" latinLnBrk="0" hangingPunct="1">
+              <a:lnSpc>
+                <a:spcPct val="90000"/>
+              </a:lnSpc>
+              <a:spcBef>
+                <a:spcPts val="500"/>
+              </a:spcBef>
+              <a:buFont typeface="Arial" panose="020B0604020202020204" pitchFamily="34" charset="0"/>
+              <a:buChar char="•"/>
+              <a:defRPr sz="1800" kern="1200">
+                <a:solidFill>
+                  <a:schemeClr val="tx1"/>
+                </a:solidFill>
+                <a:latin typeface="+mn-lt"/>
+                <a:ea typeface="+mn-ea"/>
+                <a:cs typeface="+mn-cs"/>
+              </a:defRPr>
+            </a:lvl9pPr>
+          </a:lstStyle>
+          <a:p>
+            <a:pPr marL="0" indent="0">
+              <a:buNone/>
+            </a:pPr>
+            <a:r>
+              <a:rPr lang="en-US" dirty="0"/>
+              <a:t>Working with CSV files:</a:t>
+            </a:r>
+          </a:p>
+          <a:p>
+            <a:r>
+              <a:rPr lang="en-US" dirty="0"/>
+              <a:t>The best way to open a csv file in Python is to use the with keyword in python</a:t>
+            </a:r>
+          </a:p>
+          <a:p>
+            <a:r>
+              <a:rPr lang="en-US" dirty="0"/>
+              <a:t>The main advantage of this approach is that we do not need to worry about closing the file.</a:t>
+            </a:r>
+          </a:p>
+        </p:txBody>
+      </p:sp>
     </p:spTree>
     <p:extLst>
       <p:ext uri="{BB962C8B-B14F-4D97-AF65-F5344CB8AC3E}">
@@ -1564,12 +3859,233 @@
           <a:chExt cx="0" cy="0"/>
         </a:xfrm>
       </p:grpSpPr>
+      <p:sp>
+        <p:nvSpPr>
+          <p:cNvPr id="3" name="Subtitle 2">
+            <a:extLst>
+              <a:ext uri="{FF2B5EF4-FFF2-40B4-BE49-F238E27FC236}">
+                <a16:creationId xmlns:a16="http://schemas.microsoft.com/office/drawing/2014/main" id="{BE6B7389-7423-4521-B1C7-41C7E7FB4F6E}"/>
+              </a:ext>
+            </a:extLst>
+          </p:cNvPr>
+          <p:cNvSpPr txBox="1">
+            <a:spLocks/>
+          </p:cNvSpPr>
+          <p:nvPr/>
+        </p:nvSpPr>
+        <p:spPr>
+          <a:xfrm>
+            <a:off x="401053" y="2352139"/>
+            <a:ext cx="5694947" cy="2905661"/>
+          </a:xfrm>
+          <a:prstGeom prst="rect">
+            <a:avLst/>
+          </a:prstGeom>
+        </p:spPr>
+        <p:txBody>
+          <a:bodyPr/>
+          <a:lstStyle>
+            <a:lvl1pPr marL="228600" indent="-228600" algn="l" defTabSz="914400" rtl="0" eaLnBrk="1" latinLnBrk="0" hangingPunct="1">
+              <a:lnSpc>
+                <a:spcPct val="90000"/>
+              </a:lnSpc>
+              <a:spcBef>
+                <a:spcPts val="1000"/>
+              </a:spcBef>
+              <a:buFont typeface="Arial" panose="020B0604020202020204" pitchFamily="34" charset="0"/>
+              <a:buChar char="•"/>
+              <a:defRPr sz="2800" kern="1200">
+                <a:solidFill>
+                  <a:schemeClr val="tx1"/>
+                </a:solidFill>
+                <a:latin typeface="+mn-lt"/>
+                <a:ea typeface="+mn-ea"/>
+                <a:cs typeface="+mn-cs"/>
+              </a:defRPr>
+            </a:lvl1pPr>
+            <a:lvl2pPr marL="685800" indent="-228600" algn="l" defTabSz="914400" rtl="0" eaLnBrk="1" latinLnBrk="0" hangingPunct="1">
+              <a:lnSpc>
+                <a:spcPct val="90000"/>
+              </a:lnSpc>
+              <a:spcBef>
+                <a:spcPts val="500"/>
+              </a:spcBef>
+              <a:buFont typeface="Arial" panose="020B0604020202020204" pitchFamily="34" charset="0"/>
+              <a:buChar char="•"/>
+              <a:defRPr sz="2400" kern="1200">
+                <a:solidFill>
+                  <a:schemeClr val="tx1"/>
+                </a:solidFill>
+                <a:latin typeface="+mn-lt"/>
+                <a:ea typeface="+mn-ea"/>
+                <a:cs typeface="+mn-cs"/>
+              </a:defRPr>
+            </a:lvl2pPr>
+            <a:lvl3pPr marL="1143000" indent="-228600" algn="l" defTabSz="914400" rtl="0" eaLnBrk="1" latinLnBrk="0" hangingPunct="1">
+              <a:lnSpc>
+                <a:spcPct val="90000"/>
+              </a:lnSpc>
+              <a:spcBef>
+                <a:spcPts val="500"/>
+              </a:spcBef>
+              <a:buFont typeface="Arial" panose="020B0604020202020204" pitchFamily="34" charset="0"/>
+              <a:buChar char="•"/>
+              <a:defRPr sz="2000" kern="1200">
+                <a:solidFill>
+                  <a:schemeClr val="tx1"/>
+                </a:solidFill>
+                <a:latin typeface="+mn-lt"/>
+                <a:ea typeface="+mn-ea"/>
+                <a:cs typeface="+mn-cs"/>
+              </a:defRPr>
+            </a:lvl3pPr>
+            <a:lvl4pPr marL="1600200" indent="-228600" algn="l" defTabSz="914400" rtl="0" eaLnBrk="1" latinLnBrk="0" hangingPunct="1">
+              <a:lnSpc>
+                <a:spcPct val="90000"/>
+              </a:lnSpc>
+              <a:spcBef>
+                <a:spcPts val="500"/>
+              </a:spcBef>
+              <a:buFont typeface="Arial" panose="020B0604020202020204" pitchFamily="34" charset="0"/>
+              <a:buChar char="•"/>
+              <a:defRPr sz="1800" kern="1200">
+                <a:solidFill>
+                  <a:schemeClr val="tx1"/>
+                </a:solidFill>
+                <a:latin typeface="+mn-lt"/>
+                <a:ea typeface="+mn-ea"/>
+                <a:cs typeface="+mn-cs"/>
+              </a:defRPr>
+            </a:lvl4pPr>
+            <a:lvl5pPr marL="2057400" indent="-228600" algn="l" defTabSz="914400" rtl="0" eaLnBrk="1" latinLnBrk="0" hangingPunct="1">
+              <a:lnSpc>
+                <a:spcPct val="90000"/>
+              </a:lnSpc>
+              <a:spcBef>
+                <a:spcPts val="500"/>
+              </a:spcBef>
+              <a:buFont typeface="Arial" panose="020B0604020202020204" pitchFamily="34" charset="0"/>
+              <a:buChar char="•"/>
+              <a:defRPr sz="1800" kern="1200">
+                <a:solidFill>
+                  <a:schemeClr val="tx1"/>
+                </a:solidFill>
+                <a:latin typeface="+mn-lt"/>
+                <a:ea typeface="+mn-ea"/>
+                <a:cs typeface="+mn-cs"/>
+              </a:defRPr>
+            </a:lvl5pPr>
+            <a:lvl6pPr marL="2514600" indent="-228600" algn="l" defTabSz="914400" rtl="0" eaLnBrk="1" latinLnBrk="0" hangingPunct="1">
+              <a:lnSpc>
+                <a:spcPct val="90000"/>
+              </a:lnSpc>
+              <a:spcBef>
+                <a:spcPts val="500"/>
+              </a:spcBef>
+              <a:buFont typeface="Arial" panose="020B0604020202020204" pitchFamily="34" charset="0"/>
+              <a:buChar char="•"/>
+              <a:defRPr sz="1800" kern="1200">
+                <a:solidFill>
+                  <a:schemeClr val="tx1"/>
+                </a:solidFill>
+                <a:latin typeface="+mn-lt"/>
+                <a:ea typeface="+mn-ea"/>
+                <a:cs typeface="+mn-cs"/>
+              </a:defRPr>
+            </a:lvl6pPr>
+            <a:lvl7pPr marL="2971800" indent="-228600" algn="l" defTabSz="914400" rtl="0" eaLnBrk="1" latinLnBrk="0" hangingPunct="1">
+              <a:lnSpc>
+                <a:spcPct val="90000"/>
+              </a:lnSpc>
+              <a:spcBef>
+                <a:spcPts val="500"/>
+              </a:spcBef>
+              <a:buFont typeface="Arial" panose="020B0604020202020204" pitchFamily="34" charset="0"/>
+              <a:buChar char="•"/>
+              <a:defRPr sz="1800" kern="1200">
+                <a:solidFill>
+                  <a:schemeClr val="tx1"/>
+                </a:solidFill>
+                <a:latin typeface="+mn-lt"/>
+                <a:ea typeface="+mn-ea"/>
+                <a:cs typeface="+mn-cs"/>
+              </a:defRPr>
+            </a:lvl7pPr>
+            <a:lvl8pPr marL="3429000" indent="-228600" algn="l" defTabSz="914400" rtl="0" eaLnBrk="1" latinLnBrk="0" hangingPunct="1">
+              <a:lnSpc>
+                <a:spcPct val="90000"/>
+              </a:lnSpc>
+              <a:spcBef>
+                <a:spcPts val="500"/>
+              </a:spcBef>
+              <a:buFont typeface="Arial" panose="020B0604020202020204" pitchFamily="34" charset="0"/>
+              <a:buChar char="•"/>
+              <a:defRPr sz="1800" kern="1200">
+                <a:solidFill>
+                  <a:schemeClr val="tx1"/>
+                </a:solidFill>
+                <a:latin typeface="+mn-lt"/>
+                <a:ea typeface="+mn-ea"/>
+                <a:cs typeface="+mn-cs"/>
+              </a:defRPr>
+            </a:lvl8pPr>
+            <a:lvl9pPr marL="3886200" indent="-228600" algn="l" defTabSz="914400" rtl="0" eaLnBrk="1" latinLnBrk="0" hangingPunct="1">
+              <a:lnSpc>
+                <a:spcPct val="90000"/>
+              </a:lnSpc>
+              <a:spcBef>
+                <a:spcPts val="500"/>
+              </a:spcBef>
+              <a:buFont typeface="Arial" panose="020B0604020202020204" pitchFamily="34" charset="0"/>
+              <a:buChar char="•"/>
+              <a:defRPr sz="1800" kern="1200">
+                <a:solidFill>
+                  <a:schemeClr val="tx1"/>
+                </a:solidFill>
+                <a:latin typeface="+mn-lt"/>
+                <a:ea typeface="+mn-ea"/>
+                <a:cs typeface="+mn-cs"/>
+              </a:defRPr>
+            </a:lvl9pPr>
+          </a:lstStyle>
+          <a:p>
+            <a:pPr marL="0" indent="0">
+              <a:buNone/>
+            </a:pPr>
+            <a:r>
+              <a:rPr lang="en-US" dirty="0"/>
+              <a:t>Working with CSV files:</a:t>
+            </a:r>
+          </a:p>
+          <a:p>
+            <a:r>
+              <a:rPr lang="en-US" dirty="0"/>
+              <a:t>We can write to multiple lines in a csv file by using the presented code.</a:t>
+            </a:r>
+          </a:p>
+          <a:p>
+            <a:r>
+              <a:rPr lang="en-US" dirty="0"/>
+              <a:t>We can use the special character \n which is used to insert into the next line.</a:t>
+            </a:r>
+          </a:p>
+          <a:p>
+            <a:pPr marL="0" indent="0">
+              <a:buNone/>
+            </a:pPr>
+            <a:r>
+              <a:rPr lang="en-US" dirty="0"/>
+              <a:t> </a:t>
+            </a:r>
+          </a:p>
+        </p:txBody>
+      </p:sp>
       <p:pic>
         <p:nvPicPr>
-          <p:cNvPr id="2" name="Picture 1">
+          <p:cNvPr id="4" name="Picture 3">
             <a:extLst>
               <a:ext uri="{FF2B5EF4-FFF2-40B4-BE49-F238E27FC236}">
-                <a16:creationId xmlns:a16="http://schemas.microsoft.com/office/drawing/2014/main" id="{CF323ABE-86EC-4C34-9963-E038AA73B88E}"/>
+                <a16:creationId xmlns:a16="http://schemas.microsoft.com/office/drawing/2014/main" id="{6B76ED92-FFFD-4548-B323-8769FD32A923}"/>
               </a:ext>
             </a:extLst>
           </p:cNvPr>
@@ -1592,8 +4108,8 @@
         </p:blipFill>
         <p:spPr>
           <a:xfrm>
-            <a:off x="8068176" y="2210001"/>
-            <a:ext cx="3467100" cy="1988820"/>
+            <a:off x="8323847" y="2352139"/>
+            <a:ext cx="3467100" cy="2011680"/>
           </a:xfrm>
           <a:prstGeom prst="rect">
             <a:avLst/>
@@ -1635,7 +4151,7 @@
           <p:cNvPr id="2" name="Picture 1">
             <a:extLst>
               <a:ext uri="{FF2B5EF4-FFF2-40B4-BE49-F238E27FC236}">
-                <a16:creationId xmlns:a16="http://schemas.microsoft.com/office/drawing/2014/main" id="{F66F612A-375E-4EC6-A9A6-908432783BAC}"/>
+                <a16:creationId xmlns:a16="http://schemas.microsoft.com/office/drawing/2014/main" id="{23BA6EFD-4E6F-44C0-95C1-DFBAD40DDDEB}"/>
               </a:ext>
             </a:extLst>
           </p:cNvPr>
@@ -1658,8 +4174,8 @@
         </p:blipFill>
         <p:spPr>
           <a:xfrm>
-            <a:off x="3848100" y="2335530"/>
-            <a:ext cx="4495800" cy="2186940"/>
+            <a:off x="1080497" y="941034"/>
+            <a:ext cx="10031005" cy="5273335"/>
           </a:xfrm>
           <a:prstGeom prst="rect">
             <a:avLst/>
@@ -1669,7 +4185,7 @@
     </p:spTree>
     <p:extLst>
       <p:ext uri="{BB962C8B-B14F-4D97-AF65-F5344CB8AC3E}">
-        <p14:creationId xmlns:p14="http://schemas.microsoft.com/office/powerpoint/2010/main" val="2545809705"/>
+        <p14:creationId xmlns:p14="http://schemas.microsoft.com/office/powerpoint/2010/main" val="1521234438"/>
       </p:ext>
     </p:extLst>
   </p:cSld>
@@ -1701,7 +4217,7 @@
           <p:cNvPr id="2" name="Picture 1">
             <a:extLst>
               <a:ext uri="{FF2B5EF4-FFF2-40B4-BE49-F238E27FC236}">
-                <a16:creationId xmlns:a16="http://schemas.microsoft.com/office/drawing/2014/main" id="{050B6551-8500-4D58-B191-F7FF7C945E85}"/>
+                <a16:creationId xmlns:a16="http://schemas.microsoft.com/office/drawing/2014/main" id="{F66F612A-375E-4EC6-A9A6-908432783BAC}"/>
               </a:ext>
             </a:extLst>
           </p:cNvPr>
@@ -1724,18 +4240,238 @@
         </p:blipFill>
         <p:spPr>
           <a:xfrm>
-            <a:off x="6096000" y="1643514"/>
-            <a:ext cx="4777740" cy="2865120"/>
+            <a:off x="6768853" y="2202365"/>
+            <a:ext cx="4495800" cy="2186940"/>
           </a:xfrm>
           <a:prstGeom prst="rect">
             <a:avLst/>
           </a:prstGeom>
         </p:spPr>
       </p:pic>
+      <p:sp>
+        <p:nvSpPr>
+          <p:cNvPr id="3" name="Subtitle 2">
+            <a:extLst>
+              <a:ext uri="{FF2B5EF4-FFF2-40B4-BE49-F238E27FC236}">
+                <a16:creationId xmlns:a16="http://schemas.microsoft.com/office/drawing/2014/main" id="{7147E9B3-8BF2-4EA1-B1EE-03A6666A785F}"/>
+              </a:ext>
+            </a:extLst>
+          </p:cNvPr>
+          <p:cNvSpPr txBox="1">
+            <a:spLocks/>
+          </p:cNvSpPr>
+          <p:nvPr/>
+        </p:nvSpPr>
+        <p:spPr>
+          <a:xfrm>
+            <a:off x="401053" y="2352139"/>
+            <a:ext cx="5694947" cy="2905661"/>
+          </a:xfrm>
+          <a:prstGeom prst="rect">
+            <a:avLst/>
+          </a:prstGeom>
+        </p:spPr>
+        <p:txBody>
+          <a:bodyPr/>
+          <a:lstStyle>
+            <a:lvl1pPr marL="228600" indent="-228600" algn="l" defTabSz="914400" rtl="0" eaLnBrk="1" latinLnBrk="0" hangingPunct="1">
+              <a:lnSpc>
+                <a:spcPct val="90000"/>
+              </a:lnSpc>
+              <a:spcBef>
+                <a:spcPts val="1000"/>
+              </a:spcBef>
+              <a:buFont typeface="Arial" panose="020B0604020202020204" pitchFamily="34" charset="0"/>
+              <a:buChar char="•"/>
+              <a:defRPr sz="2800" kern="1200">
+                <a:solidFill>
+                  <a:schemeClr val="tx1"/>
+                </a:solidFill>
+                <a:latin typeface="+mn-lt"/>
+                <a:ea typeface="+mn-ea"/>
+                <a:cs typeface="+mn-cs"/>
+              </a:defRPr>
+            </a:lvl1pPr>
+            <a:lvl2pPr marL="685800" indent="-228600" algn="l" defTabSz="914400" rtl="0" eaLnBrk="1" latinLnBrk="0" hangingPunct="1">
+              <a:lnSpc>
+                <a:spcPct val="90000"/>
+              </a:lnSpc>
+              <a:spcBef>
+                <a:spcPts val="500"/>
+              </a:spcBef>
+              <a:buFont typeface="Arial" panose="020B0604020202020204" pitchFamily="34" charset="0"/>
+              <a:buChar char="•"/>
+              <a:defRPr sz="2400" kern="1200">
+                <a:solidFill>
+                  <a:schemeClr val="tx1"/>
+                </a:solidFill>
+                <a:latin typeface="+mn-lt"/>
+                <a:ea typeface="+mn-ea"/>
+                <a:cs typeface="+mn-cs"/>
+              </a:defRPr>
+            </a:lvl2pPr>
+            <a:lvl3pPr marL="1143000" indent="-228600" algn="l" defTabSz="914400" rtl="0" eaLnBrk="1" latinLnBrk="0" hangingPunct="1">
+              <a:lnSpc>
+                <a:spcPct val="90000"/>
+              </a:lnSpc>
+              <a:spcBef>
+                <a:spcPts val="500"/>
+              </a:spcBef>
+              <a:buFont typeface="Arial" panose="020B0604020202020204" pitchFamily="34" charset="0"/>
+              <a:buChar char="•"/>
+              <a:defRPr sz="2000" kern="1200">
+                <a:solidFill>
+                  <a:schemeClr val="tx1"/>
+                </a:solidFill>
+                <a:latin typeface="+mn-lt"/>
+                <a:ea typeface="+mn-ea"/>
+                <a:cs typeface="+mn-cs"/>
+              </a:defRPr>
+            </a:lvl3pPr>
+            <a:lvl4pPr marL="1600200" indent="-228600" algn="l" defTabSz="914400" rtl="0" eaLnBrk="1" latinLnBrk="0" hangingPunct="1">
+              <a:lnSpc>
+                <a:spcPct val="90000"/>
+              </a:lnSpc>
+              <a:spcBef>
+                <a:spcPts val="500"/>
+              </a:spcBef>
+              <a:buFont typeface="Arial" panose="020B0604020202020204" pitchFamily="34" charset="0"/>
+              <a:buChar char="•"/>
+              <a:defRPr sz="1800" kern="1200">
+                <a:solidFill>
+                  <a:schemeClr val="tx1"/>
+                </a:solidFill>
+                <a:latin typeface="+mn-lt"/>
+                <a:ea typeface="+mn-ea"/>
+                <a:cs typeface="+mn-cs"/>
+              </a:defRPr>
+            </a:lvl4pPr>
+            <a:lvl5pPr marL="2057400" indent="-228600" algn="l" defTabSz="914400" rtl="0" eaLnBrk="1" latinLnBrk="0" hangingPunct="1">
+              <a:lnSpc>
+                <a:spcPct val="90000"/>
+              </a:lnSpc>
+              <a:spcBef>
+                <a:spcPts val="500"/>
+              </a:spcBef>
+              <a:buFont typeface="Arial" panose="020B0604020202020204" pitchFamily="34" charset="0"/>
+              <a:buChar char="•"/>
+              <a:defRPr sz="1800" kern="1200">
+                <a:solidFill>
+                  <a:schemeClr val="tx1"/>
+                </a:solidFill>
+                <a:latin typeface="+mn-lt"/>
+                <a:ea typeface="+mn-ea"/>
+                <a:cs typeface="+mn-cs"/>
+              </a:defRPr>
+            </a:lvl5pPr>
+            <a:lvl6pPr marL="2514600" indent="-228600" algn="l" defTabSz="914400" rtl="0" eaLnBrk="1" latinLnBrk="0" hangingPunct="1">
+              <a:lnSpc>
+                <a:spcPct val="90000"/>
+              </a:lnSpc>
+              <a:spcBef>
+                <a:spcPts val="500"/>
+              </a:spcBef>
+              <a:buFont typeface="Arial" panose="020B0604020202020204" pitchFamily="34" charset="0"/>
+              <a:buChar char="•"/>
+              <a:defRPr sz="1800" kern="1200">
+                <a:solidFill>
+                  <a:schemeClr val="tx1"/>
+                </a:solidFill>
+                <a:latin typeface="+mn-lt"/>
+                <a:ea typeface="+mn-ea"/>
+                <a:cs typeface="+mn-cs"/>
+              </a:defRPr>
+            </a:lvl6pPr>
+            <a:lvl7pPr marL="2971800" indent="-228600" algn="l" defTabSz="914400" rtl="0" eaLnBrk="1" latinLnBrk="0" hangingPunct="1">
+              <a:lnSpc>
+                <a:spcPct val="90000"/>
+              </a:lnSpc>
+              <a:spcBef>
+                <a:spcPts val="500"/>
+              </a:spcBef>
+              <a:buFont typeface="Arial" panose="020B0604020202020204" pitchFamily="34" charset="0"/>
+              <a:buChar char="•"/>
+              <a:defRPr sz="1800" kern="1200">
+                <a:solidFill>
+                  <a:schemeClr val="tx1"/>
+                </a:solidFill>
+                <a:latin typeface="+mn-lt"/>
+                <a:ea typeface="+mn-ea"/>
+                <a:cs typeface="+mn-cs"/>
+              </a:defRPr>
+            </a:lvl7pPr>
+            <a:lvl8pPr marL="3429000" indent="-228600" algn="l" defTabSz="914400" rtl="0" eaLnBrk="1" latinLnBrk="0" hangingPunct="1">
+              <a:lnSpc>
+                <a:spcPct val="90000"/>
+              </a:lnSpc>
+              <a:spcBef>
+                <a:spcPts val="500"/>
+              </a:spcBef>
+              <a:buFont typeface="Arial" panose="020B0604020202020204" pitchFamily="34" charset="0"/>
+              <a:buChar char="•"/>
+              <a:defRPr sz="1800" kern="1200">
+                <a:solidFill>
+                  <a:schemeClr val="tx1"/>
+                </a:solidFill>
+                <a:latin typeface="+mn-lt"/>
+                <a:ea typeface="+mn-ea"/>
+                <a:cs typeface="+mn-cs"/>
+              </a:defRPr>
+            </a:lvl8pPr>
+            <a:lvl9pPr marL="3886200" indent="-228600" algn="l" defTabSz="914400" rtl="0" eaLnBrk="1" latinLnBrk="0" hangingPunct="1">
+              <a:lnSpc>
+                <a:spcPct val="90000"/>
+              </a:lnSpc>
+              <a:spcBef>
+                <a:spcPts val="500"/>
+              </a:spcBef>
+              <a:buFont typeface="Arial" panose="020B0604020202020204" pitchFamily="34" charset="0"/>
+              <a:buChar char="•"/>
+              <a:defRPr sz="1800" kern="1200">
+                <a:solidFill>
+                  <a:schemeClr val="tx1"/>
+                </a:solidFill>
+                <a:latin typeface="+mn-lt"/>
+                <a:ea typeface="+mn-ea"/>
+                <a:cs typeface="+mn-cs"/>
+              </a:defRPr>
+            </a:lvl9pPr>
+          </a:lstStyle>
+          <a:p>
+            <a:pPr marL="0" indent="0">
+              <a:buNone/>
+            </a:pPr>
+            <a:r>
+              <a:rPr lang="en-US" dirty="0"/>
+              <a:t>Working with CSV files:</a:t>
+            </a:r>
+          </a:p>
+          <a:p>
+            <a:r>
+              <a:rPr lang="en-US" dirty="0"/>
+              <a:t>We can also assign values to multiple rows by using the </a:t>
+            </a:r>
+            <a:r>
+              <a:rPr lang="en-US" dirty="0" err="1"/>
+              <a:t>writerow</a:t>
+            </a:r>
+            <a:r>
+              <a:rPr lang="en-US" dirty="0"/>
+              <a:t>() method.</a:t>
+            </a:r>
+          </a:p>
+          <a:p>
+            <a:r>
+              <a:rPr lang="en-US" dirty="0"/>
+              <a:t>This method intakes a list as an argument. </a:t>
+            </a:r>
+          </a:p>
+        </p:txBody>
+      </p:sp>
     </p:spTree>
     <p:extLst>
       <p:ext uri="{BB962C8B-B14F-4D97-AF65-F5344CB8AC3E}">
-        <p14:creationId xmlns:p14="http://schemas.microsoft.com/office/powerpoint/2010/main" val="3699133165"/>
+        <p14:creationId xmlns:p14="http://schemas.microsoft.com/office/powerpoint/2010/main" val="2545809705"/>
       </p:ext>
     </p:extLst>
   </p:cSld>
@@ -1767,7 +4503,7 @@
           <p:cNvPr id="2" name="Picture 1">
             <a:extLst>
               <a:ext uri="{FF2B5EF4-FFF2-40B4-BE49-F238E27FC236}">
-                <a16:creationId xmlns:a16="http://schemas.microsoft.com/office/drawing/2014/main" id="{79C3C3FC-04A7-4B50-BD03-CE039AFA2FDC}"/>
+                <a16:creationId xmlns:a16="http://schemas.microsoft.com/office/drawing/2014/main" id="{050B6551-8500-4D58-B191-F7FF7C945E85}"/>
               </a:ext>
             </a:extLst>
           </p:cNvPr>
@@ -1790,18 +4526,238 @@
         </p:blipFill>
         <p:spPr>
           <a:xfrm>
-            <a:off x="6309560" y="2453640"/>
-            <a:ext cx="4610100" cy="1950720"/>
+            <a:off x="6096000" y="1643514"/>
+            <a:ext cx="4777740" cy="2865120"/>
           </a:xfrm>
           <a:prstGeom prst="rect">
             <a:avLst/>
           </a:prstGeom>
         </p:spPr>
       </p:pic>
+      <p:sp>
+        <p:nvSpPr>
+          <p:cNvPr id="3" name="Subtitle 2">
+            <a:extLst>
+              <a:ext uri="{FF2B5EF4-FFF2-40B4-BE49-F238E27FC236}">
+                <a16:creationId xmlns:a16="http://schemas.microsoft.com/office/drawing/2014/main" id="{E3CBA072-99D2-459D-AC0B-A2DDCA30B2F7}"/>
+              </a:ext>
+            </a:extLst>
+          </p:cNvPr>
+          <p:cNvSpPr txBox="1">
+            <a:spLocks/>
+          </p:cNvSpPr>
+          <p:nvPr/>
+        </p:nvSpPr>
+        <p:spPr>
+          <a:xfrm>
+            <a:off x="401053" y="2352139"/>
+            <a:ext cx="5694947" cy="2905661"/>
+          </a:xfrm>
+          <a:prstGeom prst="rect">
+            <a:avLst/>
+          </a:prstGeom>
+        </p:spPr>
+        <p:txBody>
+          <a:bodyPr/>
+          <a:lstStyle>
+            <a:lvl1pPr marL="228600" indent="-228600" algn="l" defTabSz="914400" rtl="0" eaLnBrk="1" latinLnBrk="0" hangingPunct="1">
+              <a:lnSpc>
+                <a:spcPct val="90000"/>
+              </a:lnSpc>
+              <a:spcBef>
+                <a:spcPts val="1000"/>
+              </a:spcBef>
+              <a:buFont typeface="Arial" panose="020B0604020202020204" pitchFamily="34" charset="0"/>
+              <a:buChar char="•"/>
+              <a:defRPr sz="2800" kern="1200">
+                <a:solidFill>
+                  <a:schemeClr val="tx1"/>
+                </a:solidFill>
+                <a:latin typeface="+mn-lt"/>
+                <a:ea typeface="+mn-ea"/>
+                <a:cs typeface="+mn-cs"/>
+              </a:defRPr>
+            </a:lvl1pPr>
+            <a:lvl2pPr marL="685800" indent="-228600" algn="l" defTabSz="914400" rtl="0" eaLnBrk="1" latinLnBrk="0" hangingPunct="1">
+              <a:lnSpc>
+                <a:spcPct val="90000"/>
+              </a:lnSpc>
+              <a:spcBef>
+                <a:spcPts val="500"/>
+              </a:spcBef>
+              <a:buFont typeface="Arial" panose="020B0604020202020204" pitchFamily="34" charset="0"/>
+              <a:buChar char="•"/>
+              <a:defRPr sz="2400" kern="1200">
+                <a:solidFill>
+                  <a:schemeClr val="tx1"/>
+                </a:solidFill>
+                <a:latin typeface="+mn-lt"/>
+                <a:ea typeface="+mn-ea"/>
+                <a:cs typeface="+mn-cs"/>
+              </a:defRPr>
+            </a:lvl2pPr>
+            <a:lvl3pPr marL="1143000" indent="-228600" algn="l" defTabSz="914400" rtl="0" eaLnBrk="1" latinLnBrk="0" hangingPunct="1">
+              <a:lnSpc>
+                <a:spcPct val="90000"/>
+              </a:lnSpc>
+              <a:spcBef>
+                <a:spcPts val="500"/>
+              </a:spcBef>
+              <a:buFont typeface="Arial" panose="020B0604020202020204" pitchFamily="34" charset="0"/>
+              <a:buChar char="•"/>
+              <a:defRPr sz="2000" kern="1200">
+                <a:solidFill>
+                  <a:schemeClr val="tx1"/>
+                </a:solidFill>
+                <a:latin typeface="+mn-lt"/>
+                <a:ea typeface="+mn-ea"/>
+                <a:cs typeface="+mn-cs"/>
+              </a:defRPr>
+            </a:lvl3pPr>
+            <a:lvl4pPr marL="1600200" indent="-228600" algn="l" defTabSz="914400" rtl="0" eaLnBrk="1" latinLnBrk="0" hangingPunct="1">
+              <a:lnSpc>
+                <a:spcPct val="90000"/>
+              </a:lnSpc>
+              <a:spcBef>
+                <a:spcPts val="500"/>
+              </a:spcBef>
+              <a:buFont typeface="Arial" panose="020B0604020202020204" pitchFamily="34" charset="0"/>
+              <a:buChar char="•"/>
+              <a:defRPr sz="1800" kern="1200">
+                <a:solidFill>
+                  <a:schemeClr val="tx1"/>
+                </a:solidFill>
+                <a:latin typeface="+mn-lt"/>
+                <a:ea typeface="+mn-ea"/>
+                <a:cs typeface="+mn-cs"/>
+              </a:defRPr>
+            </a:lvl4pPr>
+            <a:lvl5pPr marL="2057400" indent="-228600" algn="l" defTabSz="914400" rtl="0" eaLnBrk="1" latinLnBrk="0" hangingPunct="1">
+              <a:lnSpc>
+                <a:spcPct val="90000"/>
+              </a:lnSpc>
+              <a:spcBef>
+                <a:spcPts val="500"/>
+              </a:spcBef>
+              <a:buFont typeface="Arial" panose="020B0604020202020204" pitchFamily="34" charset="0"/>
+              <a:buChar char="•"/>
+              <a:defRPr sz="1800" kern="1200">
+                <a:solidFill>
+                  <a:schemeClr val="tx1"/>
+                </a:solidFill>
+                <a:latin typeface="+mn-lt"/>
+                <a:ea typeface="+mn-ea"/>
+                <a:cs typeface="+mn-cs"/>
+              </a:defRPr>
+            </a:lvl5pPr>
+            <a:lvl6pPr marL="2514600" indent="-228600" algn="l" defTabSz="914400" rtl="0" eaLnBrk="1" latinLnBrk="0" hangingPunct="1">
+              <a:lnSpc>
+                <a:spcPct val="90000"/>
+              </a:lnSpc>
+              <a:spcBef>
+                <a:spcPts val="500"/>
+              </a:spcBef>
+              <a:buFont typeface="Arial" panose="020B0604020202020204" pitchFamily="34" charset="0"/>
+              <a:buChar char="•"/>
+              <a:defRPr sz="1800" kern="1200">
+                <a:solidFill>
+                  <a:schemeClr val="tx1"/>
+                </a:solidFill>
+                <a:latin typeface="+mn-lt"/>
+                <a:ea typeface="+mn-ea"/>
+                <a:cs typeface="+mn-cs"/>
+              </a:defRPr>
+            </a:lvl6pPr>
+            <a:lvl7pPr marL="2971800" indent="-228600" algn="l" defTabSz="914400" rtl="0" eaLnBrk="1" latinLnBrk="0" hangingPunct="1">
+              <a:lnSpc>
+                <a:spcPct val="90000"/>
+              </a:lnSpc>
+              <a:spcBef>
+                <a:spcPts val="500"/>
+              </a:spcBef>
+              <a:buFont typeface="Arial" panose="020B0604020202020204" pitchFamily="34" charset="0"/>
+              <a:buChar char="•"/>
+              <a:defRPr sz="1800" kern="1200">
+                <a:solidFill>
+                  <a:schemeClr val="tx1"/>
+                </a:solidFill>
+                <a:latin typeface="+mn-lt"/>
+                <a:ea typeface="+mn-ea"/>
+                <a:cs typeface="+mn-cs"/>
+              </a:defRPr>
+            </a:lvl7pPr>
+            <a:lvl8pPr marL="3429000" indent="-228600" algn="l" defTabSz="914400" rtl="0" eaLnBrk="1" latinLnBrk="0" hangingPunct="1">
+              <a:lnSpc>
+                <a:spcPct val="90000"/>
+              </a:lnSpc>
+              <a:spcBef>
+                <a:spcPts val="500"/>
+              </a:spcBef>
+              <a:buFont typeface="Arial" panose="020B0604020202020204" pitchFamily="34" charset="0"/>
+              <a:buChar char="•"/>
+              <a:defRPr sz="1800" kern="1200">
+                <a:solidFill>
+                  <a:schemeClr val="tx1"/>
+                </a:solidFill>
+                <a:latin typeface="+mn-lt"/>
+                <a:ea typeface="+mn-ea"/>
+                <a:cs typeface="+mn-cs"/>
+              </a:defRPr>
+            </a:lvl8pPr>
+            <a:lvl9pPr marL="3886200" indent="-228600" algn="l" defTabSz="914400" rtl="0" eaLnBrk="1" latinLnBrk="0" hangingPunct="1">
+              <a:lnSpc>
+                <a:spcPct val="90000"/>
+              </a:lnSpc>
+              <a:spcBef>
+                <a:spcPts val="500"/>
+              </a:spcBef>
+              <a:buFont typeface="Arial" panose="020B0604020202020204" pitchFamily="34" charset="0"/>
+              <a:buChar char="•"/>
+              <a:defRPr sz="1800" kern="1200">
+                <a:solidFill>
+                  <a:schemeClr val="tx1"/>
+                </a:solidFill>
+                <a:latin typeface="+mn-lt"/>
+                <a:ea typeface="+mn-ea"/>
+                <a:cs typeface="+mn-cs"/>
+              </a:defRPr>
+            </a:lvl9pPr>
+          </a:lstStyle>
+          <a:p>
+            <a:pPr marL="0" indent="0">
+              <a:buNone/>
+            </a:pPr>
+            <a:r>
+              <a:rPr lang="en-US" dirty="0"/>
+              <a:t>Working with CSV files:</a:t>
+            </a:r>
+          </a:p>
+          <a:p>
+            <a:r>
+              <a:rPr lang="en-US" dirty="0"/>
+              <a:t>The </a:t>
+            </a:r>
+            <a:r>
+              <a:rPr lang="en-US" dirty="0" err="1"/>
+              <a:t>writerows</a:t>
+            </a:r>
+            <a:r>
+              <a:rPr lang="en-US" dirty="0"/>
+              <a:t>() method can be used to insert multiple rows in a csv file</a:t>
+            </a:r>
+          </a:p>
+          <a:p>
+            <a:r>
+              <a:rPr lang="en-US" dirty="0"/>
+              <a:t>This method takes a list of list as an argument.</a:t>
+            </a:r>
+          </a:p>
+        </p:txBody>
+      </p:sp>
     </p:spTree>
     <p:extLst>
       <p:ext uri="{BB962C8B-B14F-4D97-AF65-F5344CB8AC3E}">
-        <p14:creationId xmlns:p14="http://schemas.microsoft.com/office/powerpoint/2010/main" val="3022124540"/>
+        <p14:creationId xmlns:p14="http://schemas.microsoft.com/office/powerpoint/2010/main" val="3699133165"/>
       </p:ext>
     </p:extLst>
   </p:cSld>
@@ -1828,12 +4784,239 @@
           <a:chExt cx="0" cy="0"/>
         </a:xfrm>
       </p:grpSpPr>
+      <p:sp>
+        <p:nvSpPr>
+          <p:cNvPr id="3" name="Subtitle 2">
+            <a:extLst>
+              <a:ext uri="{FF2B5EF4-FFF2-40B4-BE49-F238E27FC236}">
+                <a16:creationId xmlns:a16="http://schemas.microsoft.com/office/drawing/2014/main" id="{4AE7D5E7-D898-4C00-B0A3-0B4EB35C51BE}"/>
+              </a:ext>
+            </a:extLst>
+          </p:cNvPr>
+          <p:cNvSpPr txBox="1">
+            <a:spLocks/>
+          </p:cNvSpPr>
+          <p:nvPr/>
+        </p:nvSpPr>
+        <p:spPr>
+          <a:xfrm>
+            <a:off x="759814" y="169674"/>
+            <a:ext cx="5694947" cy="2423688"/>
+          </a:xfrm>
+          <a:prstGeom prst="rect">
+            <a:avLst/>
+          </a:prstGeom>
+        </p:spPr>
+        <p:txBody>
+          <a:bodyPr/>
+          <a:lstStyle>
+            <a:lvl1pPr marL="228600" indent="-228600" algn="l" defTabSz="914400" rtl="0" eaLnBrk="1" latinLnBrk="0" hangingPunct="1">
+              <a:lnSpc>
+                <a:spcPct val="90000"/>
+              </a:lnSpc>
+              <a:spcBef>
+                <a:spcPts val="1000"/>
+              </a:spcBef>
+              <a:buFont typeface="Arial" panose="020B0604020202020204" pitchFamily="34" charset="0"/>
+              <a:buChar char="•"/>
+              <a:defRPr sz="2800" kern="1200">
+                <a:solidFill>
+                  <a:schemeClr val="tx1"/>
+                </a:solidFill>
+                <a:latin typeface="+mn-lt"/>
+                <a:ea typeface="+mn-ea"/>
+                <a:cs typeface="+mn-cs"/>
+              </a:defRPr>
+            </a:lvl1pPr>
+            <a:lvl2pPr marL="685800" indent="-228600" algn="l" defTabSz="914400" rtl="0" eaLnBrk="1" latinLnBrk="0" hangingPunct="1">
+              <a:lnSpc>
+                <a:spcPct val="90000"/>
+              </a:lnSpc>
+              <a:spcBef>
+                <a:spcPts val="500"/>
+              </a:spcBef>
+              <a:buFont typeface="Arial" panose="020B0604020202020204" pitchFamily="34" charset="0"/>
+              <a:buChar char="•"/>
+              <a:defRPr sz="2400" kern="1200">
+                <a:solidFill>
+                  <a:schemeClr val="tx1"/>
+                </a:solidFill>
+                <a:latin typeface="+mn-lt"/>
+                <a:ea typeface="+mn-ea"/>
+                <a:cs typeface="+mn-cs"/>
+              </a:defRPr>
+            </a:lvl2pPr>
+            <a:lvl3pPr marL="1143000" indent="-228600" algn="l" defTabSz="914400" rtl="0" eaLnBrk="1" latinLnBrk="0" hangingPunct="1">
+              <a:lnSpc>
+                <a:spcPct val="90000"/>
+              </a:lnSpc>
+              <a:spcBef>
+                <a:spcPts val="500"/>
+              </a:spcBef>
+              <a:buFont typeface="Arial" panose="020B0604020202020204" pitchFamily="34" charset="0"/>
+              <a:buChar char="•"/>
+              <a:defRPr sz="2000" kern="1200">
+                <a:solidFill>
+                  <a:schemeClr val="tx1"/>
+                </a:solidFill>
+                <a:latin typeface="+mn-lt"/>
+                <a:ea typeface="+mn-ea"/>
+                <a:cs typeface="+mn-cs"/>
+              </a:defRPr>
+            </a:lvl3pPr>
+            <a:lvl4pPr marL="1600200" indent="-228600" algn="l" defTabSz="914400" rtl="0" eaLnBrk="1" latinLnBrk="0" hangingPunct="1">
+              <a:lnSpc>
+                <a:spcPct val="90000"/>
+              </a:lnSpc>
+              <a:spcBef>
+                <a:spcPts val="500"/>
+              </a:spcBef>
+              <a:buFont typeface="Arial" panose="020B0604020202020204" pitchFamily="34" charset="0"/>
+              <a:buChar char="•"/>
+              <a:defRPr sz="1800" kern="1200">
+                <a:solidFill>
+                  <a:schemeClr val="tx1"/>
+                </a:solidFill>
+                <a:latin typeface="+mn-lt"/>
+                <a:ea typeface="+mn-ea"/>
+                <a:cs typeface="+mn-cs"/>
+              </a:defRPr>
+            </a:lvl4pPr>
+            <a:lvl5pPr marL="2057400" indent="-228600" algn="l" defTabSz="914400" rtl="0" eaLnBrk="1" latinLnBrk="0" hangingPunct="1">
+              <a:lnSpc>
+                <a:spcPct val="90000"/>
+              </a:lnSpc>
+              <a:spcBef>
+                <a:spcPts val="500"/>
+              </a:spcBef>
+              <a:buFont typeface="Arial" panose="020B0604020202020204" pitchFamily="34" charset="0"/>
+              <a:buChar char="•"/>
+              <a:defRPr sz="1800" kern="1200">
+                <a:solidFill>
+                  <a:schemeClr val="tx1"/>
+                </a:solidFill>
+                <a:latin typeface="+mn-lt"/>
+                <a:ea typeface="+mn-ea"/>
+                <a:cs typeface="+mn-cs"/>
+              </a:defRPr>
+            </a:lvl5pPr>
+            <a:lvl6pPr marL="2514600" indent="-228600" algn="l" defTabSz="914400" rtl="0" eaLnBrk="1" latinLnBrk="0" hangingPunct="1">
+              <a:lnSpc>
+                <a:spcPct val="90000"/>
+              </a:lnSpc>
+              <a:spcBef>
+                <a:spcPts val="500"/>
+              </a:spcBef>
+              <a:buFont typeface="Arial" panose="020B0604020202020204" pitchFamily="34" charset="0"/>
+              <a:buChar char="•"/>
+              <a:defRPr sz="1800" kern="1200">
+                <a:solidFill>
+                  <a:schemeClr val="tx1"/>
+                </a:solidFill>
+                <a:latin typeface="+mn-lt"/>
+                <a:ea typeface="+mn-ea"/>
+                <a:cs typeface="+mn-cs"/>
+              </a:defRPr>
+            </a:lvl6pPr>
+            <a:lvl7pPr marL="2971800" indent="-228600" algn="l" defTabSz="914400" rtl="0" eaLnBrk="1" latinLnBrk="0" hangingPunct="1">
+              <a:lnSpc>
+                <a:spcPct val="90000"/>
+              </a:lnSpc>
+              <a:spcBef>
+                <a:spcPts val="500"/>
+              </a:spcBef>
+              <a:buFont typeface="Arial" panose="020B0604020202020204" pitchFamily="34" charset="0"/>
+              <a:buChar char="•"/>
+              <a:defRPr sz="1800" kern="1200">
+                <a:solidFill>
+                  <a:schemeClr val="tx1"/>
+                </a:solidFill>
+                <a:latin typeface="+mn-lt"/>
+                <a:ea typeface="+mn-ea"/>
+                <a:cs typeface="+mn-cs"/>
+              </a:defRPr>
+            </a:lvl7pPr>
+            <a:lvl8pPr marL="3429000" indent="-228600" algn="l" defTabSz="914400" rtl="0" eaLnBrk="1" latinLnBrk="0" hangingPunct="1">
+              <a:lnSpc>
+                <a:spcPct val="90000"/>
+              </a:lnSpc>
+              <a:spcBef>
+                <a:spcPts val="500"/>
+              </a:spcBef>
+              <a:buFont typeface="Arial" panose="020B0604020202020204" pitchFamily="34" charset="0"/>
+              <a:buChar char="•"/>
+              <a:defRPr sz="1800" kern="1200">
+                <a:solidFill>
+                  <a:schemeClr val="tx1"/>
+                </a:solidFill>
+                <a:latin typeface="+mn-lt"/>
+                <a:ea typeface="+mn-ea"/>
+                <a:cs typeface="+mn-cs"/>
+              </a:defRPr>
+            </a:lvl8pPr>
+            <a:lvl9pPr marL="3886200" indent="-228600" algn="l" defTabSz="914400" rtl="0" eaLnBrk="1" latinLnBrk="0" hangingPunct="1">
+              <a:lnSpc>
+                <a:spcPct val="90000"/>
+              </a:lnSpc>
+              <a:spcBef>
+                <a:spcPts val="500"/>
+              </a:spcBef>
+              <a:buFont typeface="Arial" panose="020B0604020202020204" pitchFamily="34" charset="0"/>
+              <a:buChar char="•"/>
+              <a:defRPr sz="1800" kern="1200">
+                <a:solidFill>
+                  <a:schemeClr val="tx1"/>
+                </a:solidFill>
+                <a:latin typeface="+mn-lt"/>
+                <a:ea typeface="+mn-ea"/>
+                <a:cs typeface="+mn-cs"/>
+              </a:defRPr>
+            </a:lvl9pPr>
+          </a:lstStyle>
+          <a:p>
+            <a:pPr marL="0" indent="0">
+              <a:buNone/>
+            </a:pPr>
+            <a:r>
+              <a:rPr lang="en-US" dirty="0"/>
+              <a:t>Working with CSV files:</a:t>
+            </a:r>
+          </a:p>
+          <a:p>
+            <a:r>
+              <a:rPr lang="en-US" dirty="0"/>
+              <a:t>The </a:t>
+            </a:r>
+            <a:r>
+              <a:rPr lang="en-US" dirty="0" err="1"/>
+              <a:t>DictReader</a:t>
+            </a:r>
+            <a:r>
+              <a:rPr lang="en-US" dirty="0"/>
+              <a:t>() method inputs a csv file and </a:t>
+            </a:r>
+          </a:p>
+          <a:p>
+            <a:r>
+              <a:rPr lang="en-US" dirty="0"/>
+              <a:t>Creates a python dictionary.</a:t>
+            </a:r>
+          </a:p>
+          <a:p>
+            <a:pPr lvl="1"/>
+            <a:r>
+              <a:rPr lang="en-US" dirty="0"/>
+              <a:t>That is a Key-Value pair</a:t>
+            </a:r>
+          </a:p>
+        </p:txBody>
+      </p:sp>
       <p:pic>
         <p:nvPicPr>
-          <p:cNvPr id="2" name="Picture 1">
+          <p:cNvPr id="5" name="Picture 4">
             <a:extLst>
               <a:ext uri="{FF2B5EF4-FFF2-40B4-BE49-F238E27FC236}">
-                <a16:creationId xmlns:a16="http://schemas.microsoft.com/office/drawing/2014/main" id="{7674E8BE-024C-43AF-852F-18D95DDAF948}"/>
+                <a16:creationId xmlns:a16="http://schemas.microsoft.com/office/drawing/2014/main" id="{6722D2E1-76B1-4E93-8B92-9C3561877CE7}"/>
               </a:ext>
             </a:extLst>
           </p:cNvPr>
@@ -1856,8 +5039,409 @@
         </p:blipFill>
         <p:spPr>
           <a:xfrm>
-            <a:off x="6821905" y="1696853"/>
-            <a:ext cx="5029200" cy="3977640"/>
+            <a:off x="952243" y="4928106"/>
+            <a:ext cx="2080260" cy="1760220"/>
+          </a:xfrm>
+          <a:prstGeom prst="rect">
+            <a:avLst/>
+          </a:prstGeom>
+        </p:spPr>
+      </p:pic>
+      <p:pic>
+        <p:nvPicPr>
+          <p:cNvPr id="6" name="Picture 5">
+            <a:extLst>
+              <a:ext uri="{FF2B5EF4-FFF2-40B4-BE49-F238E27FC236}">
+                <a16:creationId xmlns:a16="http://schemas.microsoft.com/office/drawing/2014/main" id="{CA011EFA-07C1-4453-B804-D414003331A4}"/>
+              </a:ext>
+            </a:extLst>
+          </p:cNvPr>
+          <p:cNvPicPr>
+            <a:picLocks noChangeAspect="1"/>
+          </p:cNvPicPr>
+          <p:nvPr/>
+        </p:nvPicPr>
+        <p:blipFill>
+          <a:blip r:embed="rId3">
+            <a:extLst>
+              <a:ext uri="{28A0092B-C50C-407E-A947-70E740481C1C}">
+                <a14:useLocalDpi xmlns:a14="http://schemas.microsoft.com/office/drawing/2010/main" val="0"/>
+              </a:ext>
+            </a:extLst>
+          </a:blip>
+          <a:stretch>
+            <a:fillRect/>
+          </a:stretch>
+        </p:blipFill>
+        <p:spPr>
+          <a:xfrm>
+            <a:off x="6095999" y="5203313"/>
+            <a:ext cx="4465320" cy="1325880"/>
+          </a:xfrm>
+          <a:prstGeom prst="rect">
+            <a:avLst/>
+          </a:prstGeom>
+        </p:spPr>
+      </p:pic>
+      <p:pic>
+        <p:nvPicPr>
+          <p:cNvPr id="7" name="Picture Placeholder 5" descr="ReadCSVDict.py - PythonDevWork - Visual Studio Code">
+            <a:extLst>
+              <a:ext uri="{FF2B5EF4-FFF2-40B4-BE49-F238E27FC236}">
+                <a16:creationId xmlns:a16="http://schemas.microsoft.com/office/drawing/2014/main" id="{7BDB07A9-B72F-4950-9931-221040BB27D7}"/>
+              </a:ext>
+            </a:extLst>
+          </p:cNvPr>
+          <p:cNvPicPr>
+            <a:picLocks noChangeAspect="1"/>
+          </p:cNvPicPr>
+          <p:nvPr/>
+        </p:nvPicPr>
+        <p:blipFill>
+          <a:blip r:embed="rId4">
+            <a:extLst>
+              <a:ext uri="{28A0092B-C50C-407E-A947-70E740481C1C}">
+                <a14:useLocalDpi xmlns:a14="http://schemas.microsoft.com/office/drawing/2010/main" val="0"/>
+              </a:ext>
+            </a:extLst>
+          </a:blip>
+          <a:srcRect/>
+          <a:stretch>
+            <a:fillRect/>
+          </a:stretch>
+        </p:blipFill>
+        <p:spPr>
+          <a:xfrm>
+            <a:off x="1118443" y="2625188"/>
+            <a:ext cx="10349756" cy="1937934"/>
+          </a:xfrm>
+          <a:prstGeom prst="rect">
+            <a:avLst/>
+          </a:prstGeom>
+        </p:spPr>
+      </p:pic>
+    </p:spTree>
+    <p:extLst>
+      <p:ext uri="{BB962C8B-B14F-4D97-AF65-F5344CB8AC3E}">
+        <p14:creationId xmlns:p14="http://schemas.microsoft.com/office/powerpoint/2010/main" val="3022124540"/>
+      </p:ext>
+    </p:extLst>
+  </p:cSld>
+  <p:clrMapOvr>
+    <a:masterClrMapping/>
+  </p:clrMapOvr>
+</p:sld>
+</file>
+
+<file path=ppt/slides/slide9.xml><?xml version="1.0" encoding="utf-8"?>
+<p:sld xmlns:a="http://schemas.openxmlformats.org/drawingml/2006/main" xmlns:r="http://schemas.openxmlformats.org/officeDocument/2006/relationships" xmlns:p="http://schemas.openxmlformats.org/presentationml/2006/main">
+  <p:cSld>
+    <p:spTree>
+      <p:nvGrpSpPr>
+        <p:cNvPr id="1" name=""/>
+        <p:cNvGrpSpPr/>
+        <p:nvPr/>
+      </p:nvGrpSpPr>
+      <p:grpSpPr>
+        <a:xfrm>
+          <a:off x="0" y="0"/>
+          <a:ext cx="0" cy="0"/>
+          <a:chOff x="0" y="0"/>
+          <a:chExt cx="0" cy="0"/>
+        </a:xfrm>
+      </p:grpSpPr>
+      <p:pic>
+        <p:nvPicPr>
+          <p:cNvPr id="3" name="Picture 2">
+            <a:extLst>
+              <a:ext uri="{FF2B5EF4-FFF2-40B4-BE49-F238E27FC236}">
+                <a16:creationId xmlns:a16="http://schemas.microsoft.com/office/drawing/2014/main" id="{2FD64078-0C3C-49EF-BAB3-0E7B46C56021}"/>
+              </a:ext>
+            </a:extLst>
+          </p:cNvPr>
+          <p:cNvPicPr>
+            <a:picLocks noChangeAspect="1"/>
+          </p:cNvPicPr>
+          <p:nvPr/>
+        </p:nvPicPr>
+        <p:blipFill>
+          <a:blip r:embed="rId2">
+            <a:extLst>
+              <a:ext uri="{28A0092B-C50C-407E-A947-70E740481C1C}">
+                <a14:useLocalDpi xmlns:a14="http://schemas.microsoft.com/office/drawing/2010/main" val="0"/>
+              </a:ext>
+            </a:extLst>
+          </a:blip>
+          <a:stretch>
+            <a:fillRect/>
+          </a:stretch>
+        </p:blipFill>
+        <p:spPr>
+          <a:xfrm>
+            <a:off x="6976480" y="803615"/>
+            <a:ext cx="5021580" cy="5676900"/>
+          </a:xfrm>
+          <a:prstGeom prst="rect">
+            <a:avLst/>
+          </a:prstGeom>
+        </p:spPr>
+      </p:pic>
+      <p:sp>
+        <p:nvSpPr>
+          <p:cNvPr id="4" name="Subtitle 2">
+            <a:extLst>
+              <a:ext uri="{FF2B5EF4-FFF2-40B4-BE49-F238E27FC236}">
+                <a16:creationId xmlns:a16="http://schemas.microsoft.com/office/drawing/2014/main" id="{7059ECCD-2A23-46F1-8884-9F8BAD492E9E}"/>
+              </a:ext>
+            </a:extLst>
+          </p:cNvPr>
+          <p:cNvSpPr txBox="1">
+            <a:spLocks/>
+          </p:cNvSpPr>
+          <p:nvPr/>
+        </p:nvSpPr>
+        <p:spPr>
+          <a:xfrm>
+            <a:off x="401053" y="595801"/>
+            <a:ext cx="5694947" cy="4766311"/>
+          </a:xfrm>
+          <a:prstGeom prst="rect">
+            <a:avLst/>
+          </a:prstGeom>
+        </p:spPr>
+        <p:txBody>
+          <a:bodyPr/>
+          <a:lstStyle>
+            <a:lvl1pPr marL="228600" indent="-228600" algn="l" defTabSz="914400" rtl="0" eaLnBrk="1" latinLnBrk="0" hangingPunct="1">
+              <a:lnSpc>
+                <a:spcPct val="90000"/>
+              </a:lnSpc>
+              <a:spcBef>
+                <a:spcPts val="1000"/>
+              </a:spcBef>
+              <a:buFont typeface="Arial" panose="020B0604020202020204" pitchFamily="34" charset="0"/>
+              <a:buChar char="•"/>
+              <a:defRPr sz="2800" kern="1200">
+                <a:solidFill>
+                  <a:schemeClr val="tx1"/>
+                </a:solidFill>
+                <a:latin typeface="+mn-lt"/>
+                <a:ea typeface="+mn-ea"/>
+                <a:cs typeface="+mn-cs"/>
+              </a:defRPr>
+            </a:lvl1pPr>
+            <a:lvl2pPr marL="685800" indent="-228600" algn="l" defTabSz="914400" rtl="0" eaLnBrk="1" latinLnBrk="0" hangingPunct="1">
+              <a:lnSpc>
+                <a:spcPct val="90000"/>
+              </a:lnSpc>
+              <a:spcBef>
+                <a:spcPts val="500"/>
+              </a:spcBef>
+              <a:buFont typeface="Arial" panose="020B0604020202020204" pitchFamily="34" charset="0"/>
+              <a:buChar char="•"/>
+              <a:defRPr sz="2400" kern="1200">
+                <a:solidFill>
+                  <a:schemeClr val="tx1"/>
+                </a:solidFill>
+                <a:latin typeface="+mn-lt"/>
+                <a:ea typeface="+mn-ea"/>
+                <a:cs typeface="+mn-cs"/>
+              </a:defRPr>
+            </a:lvl2pPr>
+            <a:lvl3pPr marL="1143000" indent="-228600" algn="l" defTabSz="914400" rtl="0" eaLnBrk="1" latinLnBrk="0" hangingPunct="1">
+              <a:lnSpc>
+                <a:spcPct val="90000"/>
+              </a:lnSpc>
+              <a:spcBef>
+                <a:spcPts val="500"/>
+              </a:spcBef>
+              <a:buFont typeface="Arial" panose="020B0604020202020204" pitchFamily="34" charset="0"/>
+              <a:buChar char="•"/>
+              <a:defRPr sz="2000" kern="1200">
+                <a:solidFill>
+                  <a:schemeClr val="tx1"/>
+                </a:solidFill>
+                <a:latin typeface="+mn-lt"/>
+                <a:ea typeface="+mn-ea"/>
+                <a:cs typeface="+mn-cs"/>
+              </a:defRPr>
+            </a:lvl3pPr>
+            <a:lvl4pPr marL="1600200" indent="-228600" algn="l" defTabSz="914400" rtl="0" eaLnBrk="1" latinLnBrk="0" hangingPunct="1">
+              <a:lnSpc>
+                <a:spcPct val="90000"/>
+              </a:lnSpc>
+              <a:spcBef>
+                <a:spcPts val="500"/>
+              </a:spcBef>
+              <a:buFont typeface="Arial" panose="020B0604020202020204" pitchFamily="34" charset="0"/>
+              <a:buChar char="•"/>
+              <a:defRPr sz="1800" kern="1200">
+                <a:solidFill>
+                  <a:schemeClr val="tx1"/>
+                </a:solidFill>
+                <a:latin typeface="+mn-lt"/>
+                <a:ea typeface="+mn-ea"/>
+                <a:cs typeface="+mn-cs"/>
+              </a:defRPr>
+            </a:lvl4pPr>
+            <a:lvl5pPr marL="2057400" indent="-228600" algn="l" defTabSz="914400" rtl="0" eaLnBrk="1" latinLnBrk="0" hangingPunct="1">
+              <a:lnSpc>
+                <a:spcPct val="90000"/>
+              </a:lnSpc>
+              <a:spcBef>
+                <a:spcPts val="500"/>
+              </a:spcBef>
+              <a:buFont typeface="Arial" panose="020B0604020202020204" pitchFamily="34" charset="0"/>
+              <a:buChar char="•"/>
+              <a:defRPr sz="1800" kern="1200">
+                <a:solidFill>
+                  <a:schemeClr val="tx1"/>
+                </a:solidFill>
+                <a:latin typeface="+mn-lt"/>
+                <a:ea typeface="+mn-ea"/>
+                <a:cs typeface="+mn-cs"/>
+              </a:defRPr>
+            </a:lvl5pPr>
+            <a:lvl6pPr marL="2514600" indent="-228600" algn="l" defTabSz="914400" rtl="0" eaLnBrk="1" latinLnBrk="0" hangingPunct="1">
+              <a:lnSpc>
+                <a:spcPct val="90000"/>
+              </a:lnSpc>
+              <a:spcBef>
+                <a:spcPts val="500"/>
+              </a:spcBef>
+              <a:buFont typeface="Arial" panose="020B0604020202020204" pitchFamily="34" charset="0"/>
+              <a:buChar char="•"/>
+              <a:defRPr sz="1800" kern="1200">
+                <a:solidFill>
+                  <a:schemeClr val="tx1"/>
+                </a:solidFill>
+                <a:latin typeface="+mn-lt"/>
+                <a:ea typeface="+mn-ea"/>
+                <a:cs typeface="+mn-cs"/>
+              </a:defRPr>
+            </a:lvl6pPr>
+            <a:lvl7pPr marL="2971800" indent="-228600" algn="l" defTabSz="914400" rtl="0" eaLnBrk="1" latinLnBrk="0" hangingPunct="1">
+              <a:lnSpc>
+                <a:spcPct val="90000"/>
+              </a:lnSpc>
+              <a:spcBef>
+                <a:spcPts val="500"/>
+              </a:spcBef>
+              <a:buFont typeface="Arial" panose="020B0604020202020204" pitchFamily="34" charset="0"/>
+              <a:buChar char="•"/>
+              <a:defRPr sz="1800" kern="1200">
+                <a:solidFill>
+                  <a:schemeClr val="tx1"/>
+                </a:solidFill>
+                <a:latin typeface="+mn-lt"/>
+                <a:ea typeface="+mn-ea"/>
+                <a:cs typeface="+mn-cs"/>
+              </a:defRPr>
+            </a:lvl7pPr>
+            <a:lvl8pPr marL="3429000" indent="-228600" algn="l" defTabSz="914400" rtl="0" eaLnBrk="1" latinLnBrk="0" hangingPunct="1">
+              <a:lnSpc>
+                <a:spcPct val="90000"/>
+              </a:lnSpc>
+              <a:spcBef>
+                <a:spcPts val="500"/>
+              </a:spcBef>
+              <a:buFont typeface="Arial" panose="020B0604020202020204" pitchFamily="34" charset="0"/>
+              <a:buChar char="•"/>
+              <a:defRPr sz="1800" kern="1200">
+                <a:solidFill>
+                  <a:schemeClr val="tx1"/>
+                </a:solidFill>
+                <a:latin typeface="+mn-lt"/>
+                <a:ea typeface="+mn-ea"/>
+                <a:cs typeface="+mn-cs"/>
+              </a:defRPr>
+            </a:lvl8pPr>
+            <a:lvl9pPr marL="3886200" indent="-228600" algn="l" defTabSz="914400" rtl="0" eaLnBrk="1" latinLnBrk="0" hangingPunct="1">
+              <a:lnSpc>
+                <a:spcPct val="90000"/>
+              </a:lnSpc>
+              <a:spcBef>
+                <a:spcPts val="500"/>
+              </a:spcBef>
+              <a:buFont typeface="Arial" panose="020B0604020202020204" pitchFamily="34" charset="0"/>
+              <a:buChar char="•"/>
+              <a:defRPr sz="1800" kern="1200">
+                <a:solidFill>
+                  <a:schemeClr val="tx1"/>
+                </a:solidFill>
+                <a:latin typeface="+mn-lt"/>
+                <a:ea typeface="+mn-ea"/>
+                <a:cs typeface="+mn-cs"/>
+              </a:defRPr>
+            </a:lvl9pPr>
+          </a:lstStyle>
+          <a:p>
+            <a:pPr marL="0" indent="0">
+              <a:buNone/>
+            </a:pPr>
+            <a:r>
+              <a:rPr lang="en-US" dirty="0"/>
+              <a:t>Working with CSV files:</a:t>
+            </a:r>
+          </a:p>
+          <a:p>
+            <a:r>
+              <a:rPr lang="en-US" dirty="0"/>
+              <a:t>We can use the truncate method to delete contents of the csv file</a:t>
+            </a:r>
+          </a:p>
+          <a:p>
+            <a:r>
+              <a:rPr lang="en-US" dirty="0"/>
+              <a:t>We also write to a csv file from a dictionary.</a:t>
+            </a:r>
+          </a:p>
+          <a:p>
+            <a:r>
+              <a:rPr lang="en-US" dirty="0"/>
+              <a:t>As shown in the code this can be done by using the </a:t>
+            </a:r>
+            <a:r>
+              <a:rPr lang="en-US" dirty="0" err="1"/>
+              <a:t>DictWriter</a:t>
+            </a:r>
+            <a:r>
+              <a:rPr lang="en-US" dirty="0"/>
+              <a:t> method.</a:t>
+            </a:r>
+          </a:p>
+        </p:txBody>
+      </p:sp>
+      <p:pic>
+        <p:nvPicPr>
+          <p:cNvPr id="5" name="Picture 4">
+            <a:extLst>
+              <a:ext uri="{FF2B5EF4-FFF2-40B4-BE49-F238E27FC236}">
+                <a16:creationId xmlns:a16="http://schemas.microsoft.com/office/drawing/2014/main" id="{2D53EA20-8C35-44DD-8691-22AC751D24AA}"/>
+              </a:ext>
+            </a:extLst>
+          </p:cNvPr>
+          <p:cNvPicPr>
+            <a:picLocks noChangeAspect="1"/>
+          </p:cNvPicPr>
+          <p:nvPr/>
+        </p:nvPicPr>
+        <p:blipFill>
+          <a:blip r:embed="rId3">
+            <a:extLst>
+              <a:ext uri="{28A0092B-C50C-407E-A947-70E740481C1C}">
+                <a14:useLocalDpi xmlns:a14="http://schemas.microsoft.com/office/drawing/2010/main" val="0"/>
+              </a:ext>
+            </a:extLst>
+          </a:blip>
+          <a:stretch>
+            <a:fillRect/>
+          </a:stretch>
+        </p:blipFill>
+        <p:spPr>
+          <a:xfrm>
+            <a:off x="2131713" y="4942458"/>
+            <a:ext cx="3329940" cy="1181100"/>
           </a:xfrm>
           <a:prstGeom prst="rect">
             <a:avLst/>

</xml_diff>